<commit_message>
Modification diapo rendu, partie Kira
</commit_message>
<xml_diff>
--- a/Rendu/Diapo_prototype_janvier.pptx
+++ b/Rendu/Diapo_prototype_janvier.pptx
@@ -240,7 +240,7 @@
           <a:p>
             <a:fld id="{59FF9AFC-EE31-4165-8F20-7F1E2683D74A}" type="datetimeFigureOut">
               <a:rPr lang="fr-FR" smtClean="0"/>
-              <a:t>28/11/2015</a:t>
+              <a:t>02/12/2015</a:t>
             </a:fld>
             <a:endParaRPr lang="fr-FR"/>
           </a:p>
@@ -410,7 +410,7 @@
           <a:p>
             <a:fld id="{59FF9AFC-EE31-4165-8F20-7F1E2683D74A}" type="datetimeFigureOut">
               <a:rPr lang="fr-FR" smtClean="0"/>
-              <a:t>28/11/2015</a:t>
+              <a:t>02/12/2015</a:t>
             </a:fld>
             <a:endParaRPr lang="fr-FR"/>
           </a:p>
@@ -590,7 +590,7 @@
           <a:p>
             <a:fld id="{59FF9AFC-EE31-4165-8F20-7F1E2683D74A}" type="datetimeFigureOut">
               <a:rPr lang="fr-FR" smtClean="0"/>
-              <a:t>28/11/2015</a:t>
+              <a:t>02/12/2015</a:t>
             </a:fld>
             <a:endParaRPr lang="fr-FR"/>
           </a:p>
@@ -760,7 +760,7 @@
           <a:p>
             <a:fld id="{59FF9AFC-EE31-4165-8F20-7F1E2683D74A}" type="datetimeFigureOut">
               <a:rPr lang="fr-FR" smtClean="0"/>
-              <a:t>28/11/2015</a:t>
+              <a:t>02/12/2015</a:t>
             </a:fld>
             <a:endParaRPr lang="fr-FR"/>
           </a:p>
@@ -1006,7 +1006,7 @@
           <a:p>
             <a:fld id="{59FF9AFC-EE31-4165-8F20-7F1E2683D74A}" type="datetimeFigureOut">
               <a:rPr lang="fr-FR" smtClean="0"/>
-              <a:t>28/11/2015</a:t>
+              <a:t>02/12/2015</a:t>
             </a:fld>
             <a:endParaRPr lang="fr-FR"/>
           </a:p>
@@ -1238,7 +1238,7 @@
           <a:p>
             <a:fld id="{59FF9AFC-EE31-4165-8F20-7F1E2683D74A}" type="datetimeFigureOut">
               <a:rPr lang="fr-FR" smtClean="0"/>
-              <a:t>28/11/2015</a:t>
+              <a:t>02/12/2015</a:t>
             </a:fld>
             <a:endParaRPr lang="fr-FR"/>
           </a:p>
@@ -1605,7 +1605,7 @@
           <a:p>
             <a:fld id="{59FF9AFC-EE31-4165-8F20-7F1E2683D74A}" type="datetimeFigureOut">
               <a:rPr lang="fr-FR" smtClean="0"/>
-              <a:t>28/11/2015</a:t>
+              <a:t>02/12/2015</a:t>
             </a:fld>
             <a:endParaRPr lang="fr-FR"/>
           </a:p>
@@ -1723,7 +1723,7 @@
           <a:p>
             <a:fld id="{59FF9AFC-EE31-4165-8F20-7F1E2683D74A}" type="datetimeFigureOut">
               <a:rPr lang="fr-FR" smtClean="0"/>
-              <a:t>28/11/2015</a:t>
+              <a:t>02/12/2015</a:t>
             </a:fld>
             <a:endParaRPr lang="fr-FR"/>
           </a:p>
@@ -1818,7 +1818,7 @@
           <a:p>
             <a:fld id="{59FF9AFC-EE31-4165-8F20-7F1E2683D74A}" type="datetimeFigureOut">
               <a:rPr lang="fr-FR" smtClean="0"/>
-              <a:t>28/11/2015</a:t>
+              <a:t>02/12/2015</a:t>
             </a:fld>
             <a:endParaRPr lang="fr-FR"/>
           </a:p>
@@ -2095,7 +2095,7 @@
           <a:p>
             <a:fld id="{59FF9AFC-EE31-4165-8F20-7F1E2683D74A}" type="datetimeFigureOut">
               <a:rPr lang="fr-FR" smtClean="0"/>
-              <a:t>28/11/2015</a:t>
+              <a:t>02/12/2015</a:t>
             </a:fld>
             <a:endParaRPr lang="fr-FR"/>
           </a:p>
@@ -2348,7 +2348,7 @@
           <a:p>
             <a:fld id="{59FF9AFC-EE31-4165-8F20-7F1E2683D74A}" type="datetimeFigureOut">
               <a:rPr lang="fr-FR" smtClean="0"/>
-              <a:t>28/11/2015</a:t>
+              <a:t>02/12/2015</a:t>
             </a:fld>
             <a:endParaRPr lang="fr-FR"/>
           </a:p>
@@ -2561,7 +2561,7 @@
           <a:p>
             <a:fld id="{59FF9AFC-EE31-4165-8F20-7F1E2683D74A}" type="datetimeFigureOut">
               <a:rPr lang="fr-FR" smtClean="0"/>
-              <a:t>28/11/2015</a:t>
+              <a:t>02/12/2015</a:t>
             </a:fld>
             <a:endParaRPr lang="fr-FR"/>
           </a:p>
@@ -3099,14 +3099,14 @@
             <p:ph idx="1"/>
             <p:extLst>
               <p:ext uri="{D42A27DB-BD31-4B8C-83A1-F6EECF244321}">
-                <p14:modId xmlns:p14="http://schemas.microsoft.com/office/powerpoint/2010/main" val="4098873199"/>
+                <p14:modId xmlns:p14="http://schemas.microsoft.com/office/powerpoint/2010/main" val="1977867489"/>
               </p:ext>
             </p:extLst>
           </p:nvPr>
         </p:nvGraphicFramePr>
         <p:xfrm>
           <a:off x="365758" y="1143002"/>
-          <a:ext cx="11407141" cy="5424801"/>
+          <a:ext cx="11407141" cy="5452143"/>
         </p:xfrm>
         <a:graphic>
           <a:graphicData uri="http://schemas.openxmlformats.org/drawingml/2006/table">
@@ -3317,16 +3317,16 @@
                         <a:t>complete</a:t>
                       </a:r>
                       <a:r>
-                        <a:rPr lang="fr-FR" sz="2400" dirty="0" smtClean="0">
+                        <a:rPr lang="fr-FR" sz="2400" smtClean="0">
                           <a:effectLst/>
                         </a:rPr>
                         <a:t> </a:t>
                       </a:r>
                       <a:r>
-                        <a:rPr lang="fr-FR" sz="2400" dirty="0">
-                          <a:effectLst/>
-                        </a:rPr>
-                        <a:t>et portable</a:t>
+                        <a:rPr lang="fr-FR" sz="2400" smtClean="0">
+                          <a:effectLst/>
+                        </a:rPr>
+                        <a:t>and portable</a:t>
                       </a:r>
                       <a:endParaRPr lang="fr-FR" sz="2400" dirty="0">
                         <a:effectLst/>
@@ -4986,7 +4986,7 @@
     </a:clrScheme>
     <a:fontScheme name="Office">
       <a:majorFont>
-        <a:latin typeface="Calibri Light" panose="020F0302020204030204"/>
+        <a:latin typeface="Calibri Light"/>
         <a:ea typeface=""/>
         <a:cs typeface=""/>
         <a:font script="Jpan" typeface="ＭＳ Ｐゴシック"/>
@@ -5021,7 +5021,7 @@
         <a:font script="Geor" typeface="Sylfaen"/>
       </a:majorFont>
       <a:minorFont>
-        <a:latin typeface="Calibri" panose="020F0502020204030204"/>
+        <a:latin typeface="Calibri"/>
         <a:ea typeface=""/>
         <a:cs typeface=""/>
         <a:font script="Jpan" typeface="ＭＳ Ｐゴシック"/>
@@ -5198,7 +5198,7 @@
   <a:extraClrSchemeLst/>
   <a:extLst>
     <a:ext uri="{05A4C25C-085E-4340-85A3-A5531E510DB2}">
-      <thm15:themeFamily xmlns:thm15="http://schemas.microsoft.com/office/thememl/2012/main" name="Office Theme" id="{62F939B6-93AF-4DB8-9C6B-D6C7DFDC589F}" vid="{4A3C46E8-61CC-4603-A589-7422A47A8E4A}"/>
+      <thm15:themeFamily xmlns:thm15="http://schemas.microsoft.com/office/thememl/2012/main" xmlns="" name="Office Theme" id="{62F939B6-93AF-4DB8-9C6B-D6C7DFDC589F}" vid="{4A3C46E8-61CC-4603-A589-7422A47A8E4A}"/>
     </a:ext>
   </a:extLst>
 </a:theme>

</xml_diff>

<commit_message>
Ajout mots clés en anglais sur diapo
</commit_message>
<xml_diff>
--- a/Rendu/Diapo_prototype_janvier.pptx
+++ b/Rendu/Diapo_prototype_janvier.pptx
@@ -6,8 +6,12 @@
   </p:sldMasterIdLst>
   <p:sldIdLst>
     <p:sldId id="256" r:id="rId2"/>
-    <p:sldId id="257" r:id="rId3"/>
-    <p:sldId id="258" r:id="rId4"/>
+    <p:sldId id="259" r:id="rId3"/>
+    <p:sldId id="261" r:id="rId4"/>
+    <p:sldId id="263" r:id="rId5"/>
+    <p:sldId id="257" r:id="rId6"/>
+    <p:sldId id="258" r:id="rId7"/>
+    <p:sldId id="264" r:id="rId8"/>
   </p:sldIdLst>
   <p:sldSz cx="12192000" cy="6858000"/>
   <p:notesSz cx="6858000" cy="9144000"/>
@@ -106,6 +110,22 @@
       </a:defRPr>
     </a:lvl9pPr>
   </p:defaultTextStyle>
+  <p:extLst>
+    <p:ext uri="{EFAFB233-063F-42B5-8137-9DF3F51BA10A}">
+      <p15:sldGuideLst xmlns:p15="http://schemas.microsoft.com/office/powerpoint/2012/main">
+        <p15:guide id="1" orient="horz" pos="2160">
+          <p15:clr>
+            <a:srgbClr val="A4A3A4"/>
+          </p15:clr>
+        </p15:guide>
+        <p15:guide id="2" pos="3840">
+          <p15:clr>
+            <a:srgbClr val="A4A3A4"/>
+          </p15:clr>
+        </p15:guide>
+      </p15:sldGuideLst>
+    </p:ext>
+  </p:extLst>
 </p:presentation>
 </file>
 
@@ -240,7 +260,7 @@
           <a:p>
             <a:fld id="{59FF9AFC-EE31-4165-8F20-7F1E2683D74A}" type="datetimeFigureOut">
               <a:rPr lang="fr-FR" smtClean="0"/>
-              <a:t>03/12/2015</a:t>
+              <a:t>05/12/2015</a:t>
             </a:fld>
             <a:endParaRPr lang="fr-FR"/>
           </a:p>
@@ -410,7 +430,7 @@
           <a:p>
             <a:fld id="{59FF9AFC-EE31-4165-8F20-7F1E2683D74A}" type="datetimeFigureOut">
               <a:rPr lang="fr-FR" smtClean="0"/>
-              <a:t>03/12/2015</a:t>
+              <a:t>05/12/2015</a:t>
             </a:fld>
             <a:endParaRPr lang="fr-FR"/>
           </a:p>
@@ -590,7 +610,7 @@
           <a:p>
             <a:fld id="{59FF9AFC-EE31-4165-8F20-7F1E2683D74A}" type="datetimeFigureOut">
               <a:rPr lang="fr-FR" smtClean="0"/>
-              <a:t>03/12/2015</a:t>
+              <a:t>05/12/2015</a:t>
             </a:fld>
             <a:endParaRPr lang="fr-FR"/>
           </a:p>
@@ -760,7 +780,7 @@
           <a:p>
             <a:fld id="{59FF9AFC-EE31-4165-8F20-7F1E2683D74A}" type="datetimeFigureOut">
               <a:rPr lang="fr-FR" smtClean="0"/>
-              <a:t>03/12/2015</a:t>
+              <a:t>05/12/2015</a:t>
             </a:fld>
             <a:endParaRPr lang="fr-FR"/>
           </a:p>
@@ -1006,7 +1026,7 @@
           <a:p>
             <a:fld id="{59FF9AFC-EE31-4165-8F20-7F1E2683D74A}" type="datetimeFigureOut">
               <a:rPr lang="fr-FR" smtClean="0"/>
-              <a:t>03/12/2015</a:t>
+              <a:t>05/12/2015</a:t>
             </a:fld>
             <a:endParaRPr lang="fr-FR"/>
           </a:p>
@@ -1238,7 +1258,7 @@
           <a:p>
             <a:fld id="{59FF9AFC-EE31-4165-8F20-7F1E2683D74A}" type="datetimeFigureOut">
               <a:rPr lang="fr-FR" smtClean="0"/>
-              <a:t>03/12/2015</a:t>
+              <a:t>05/12/2015</a:t>
             </a:fld>
             <a:endParaRPr lang="fr-FR"/>
           </a:p>
@@ -1605,7 +1625,7 @@
           <a:p>
             <a:fld id="{59FF9AFC-EE31-4165-8F20-7F1E2683D74A}" type="datetimeFigureOut">
               <a:rPr lang="fr-FR" smtClean="0"/>
-              <a:t>03/12/2015</a:t>
+              <a:t>05/12/2015</a:t>
             </a:fld>
             <a:endParaRPr lang="fr-FR"/>
           </a:p>
@@ -1723,7 +1743,7 @@
           <a:p>
             <a:fld id="{59FF9AFC-EE31-4165-8F20-7F1E2683D74A}" type="datetimeFigureOut">
               <a:rPr lang="fr-FR" smtClean="0"/>
-              <a:t>03/12/2015</a:t>
+              <a:t>05/12/2015</a:t>
             </a:fld>
             <a:endParaRPr lang="fr-FR"/>
           </a:p>
@@ -1818,7 +1838,7 @@
           <a:p>
             <a:fld id="{59FF9AFC-EE31-4165-8F20-7F1E2683D74A}" type="datetimeFigureOut">
               <a:rPr lang="fr-FR" smtClean="0"/>
-              <a:t>03/12/2015</a:t>
+              <a:t>05/12/2015</a:t>
             </a:fld>
             <a:endParaRPr lang="fr-FR"/>
           </a:p>
@@ -2095,7 +2115,7 @@
           <a:p>
             <a:fld id="{59FF9AFC-EE31-4165-8F20-7F1E2683D74A}" type="datetimeFigureOut">
               <a:rPr lang="fr-FR" smtClean="0"/>
-              <a:t>03/12/2015</a:t>
+              <a:t>05/12/2015</a:t>
             </a:fld>
             <a:endParaRPr lang="fr-FR"/>
           </a:p>
@@ -2348,7 +2368,7 @@
           <a:p>
             <a:fld id="{59FF9AFC-EE31-4165-8F20-7F1E2683D74A}" type="datetimeFigureOut">
               <a:rPr lang="fr-FR" smtClean="0"/>
-              <a:t>03/12/2015</a:t>
+              <a:t>05/12/2015</a:t>
             </a:fld>
             <a:endParaRPr lang="fr-FR"/>
           </a:p>
@@ -2561,7 +2581,7 @@
           <a:p>
             <a:fld id="{59FF9AFC-EE31-4165-8F20-7F1E2683D74A}" type="datetimeFigureOut">
               <a:rPr lang="fr-FR" smtClean="0"/>
-              <a:t>03/12/2015</a:t>
+              <a:t>05/12/2015</a:t>
             </a:fld>
             <a:endParaRPr lang="fr-FR"/>
           </a:p>
@@ -2981,26 +3001,19 @@
           <a:bodyPr/>
           <a:lstStyle/>
           <a:p>
+            <a:r>
+              <a:rPr lang="fr-FR" dirty="0" err="1"/>
+              <a:t>Domotic</a:t>
+            </a:r>
+            <a:r>
+              <a:rPr lang="fr-FR" dirty="0"/>
+              <a:t> control interface on  </a:t>
+            </a:r>
+            <a:r>
+              <a:rPr lang="fr-FR" dirty="0" err="1"/>
+              <a:t>tablet</a:t>
+            </a:r>
             <a:endParaRPr lang="fr-FR" dirty="0"/>
-          </a:p>
-        </p:txBody>
-      </p:sp>
-      <p:sp>
-        <p:nvSpPr>
-          <p:cNvPr id="3" name="Sous-titre 2"/>
-          <p:cNvSpPr>
-            <a:spLocks noGrp="1"/>
-          </p:cNvSpPr>
-          <p:nvPr>
-            <p:ph type="subTitle" idx="1"/>
-          </p:nvPr>
-        </p:nvSpPr>
-        <p:spPr/>
-        <p:txBody>
-          <a:bodyPr/>
-          <a:lstStyle/>
-          <a:p>
-            <a:endParaRPr lang="fr-FR"/>
           </a:p>
         </p:txBody>
       </p:sp>
@@ -3025,6 +3038,514 @@
 </file>
 
 <file path=ppt/slides/slide2.xml><?xml version="1.0" encoding="utf-8"?>
+<p:sld xmlns:a="http://schemas.openxmlformats.org/drawingml/2006/main" xmlns:r="http://schemas.openxmlformats.org/officeDocument/2006/relationships" xmlns:p="http://schemas.openxmlformats.org/presentationml/2006/main">
+  <p:cSld>
+    <p:spTree>
+      <p:nvGrpSpPr>
+        <p:cNvPr id="1" name=""/>
+        <p:cNvGrpSpPr/>
+        <p:nvPr/>
+      </p:nvGrpSpPr>
+      <p:grpSpPr>
+        <a:xfrm>
+          <a:off x="0" y="0"/>
+          <a:ext cx="0" cy="0"/>
+          <a:chOff x="0" y="0"/>
+          <a:chExt cx="0" cy="0"/>
+        </a:xfrm>
+      </p:grpSpPr>
+      <p:sp>
+        <p:nvSpPr>
+          <p:cNvPr id="2" name="Titre 1"/>
+          <p:cNvSpPr>
+            <a:spLocks noGrp="1"/>
+          </p:cNvSpPr>
+          <p:nvPr>
+            <p:ph type="title"/>
+          </p:nvPr>
+        </p:nvSpPr>
+        <p:spPr/>
+        <p:txBody>
+          <a:bodyPr/>
+          <a:lstStyle/>
+          <a:p>
+            <a:r>
+              <a:rPr lang="fr-FR" dirty="0"/>
+              <a:t>Contents</a:t>
+            </a:r>
+          </a:p>
+        </p:txBody>
+      </p:sp>
+      <p:sp>
+        <p:nvSpPr>
+          <p:cNvPr id="3" name="Espace réservé du contenu 2"/>
+          <p:cNvSpPr>
+            <a:spLocks noGrp="1"/>
+          </p:cNvSpPr>
+          <p:nvPr>
+            <p:ph idx="1"/>
+          </p:nvPr>
+        </p:nvSpPr>
+        <p:spPr/>
+        <p:txBody>
+          <a:bodyPr/>
+          <a:lstStyle/>
+          <a:p>
+            <a:endParaRPr lang="fr-FR" dirty="0"/>
+          </a:p>
+          <a:p>
+            <a:pPr marL="0" indent="0">
+              <a:buNone/>
+            </a:pPr>
+            <a:r>
+              <a:rPr lang="fr-FR" dirty="0"/>
+              <a:t>• </a:t>
+            </a:r>
+            <a:r>
+              <a:rPr lang="fr-FR" dirty="0" err="1"/>
+              <a:t>Context</a:t>
+            </a:r>
+            <a:endParaRPr lang="fr-FR" dirty="0"/>
+          </a:p>
+          <a:p>
+            <a:pPr marL="0" indent="0">
+              <a:buNone/>
+            </a:pPr>
+            <a:r>
+              <a:rPr lang="fr-FR" dirty="0"/>
+              <a:t>• </a:t>
+            </a:r>
+            <a:r>
+              <a:rPr lang="fr-FR" dirty="0" err="1"/>
+              <a:t>Pre-study</a:t>
+            </a:r>
+            <a:endParaRPr lang="fr-FR" dirty="0"/>
+          </a:p>
+          <a:p>
+            <a:pPr marL="0" indent="0">
+              <a:buNone/>
+            </a:pPr>
+            <a:r>
+              <a:rPr lang="fr-FR" dirty="0"/>
+              <a:t>• </a:t>
+            </a:r>
+            <a:r>
+              <a:rPr lang="fr-FR" dirty="0" err="1"/>
+              <a:t>Specifications</a:t>
+            </a:r>
+            <a:endParaRPr lang="fr-FR" dirty="0"/>
+          </a:p>
+          <a:p>
+            <a:endParaRPr lang="fr-FR" dirty="0"/>
+          </a:p>
+        </p:txBody>
+      </p:sp>
+    </p:spTree>
+    <p:extLst>
+      <p:ext uri="{BB962C8B-B14F-4D97-AF65-F5344CB8AC3E}">
+        <p14:creationId xmlns:p14="http://schemas.microsoft.com/office/powerpoint/2010/main" val="2577434995"/>
+      </p:ext>
+    </p:extLst>
+  </p:cSld>
+  <p:clrMapOvr>
+    <a:masterClrMapping/>
+  </p:clrMapOvr>
+</p:sld>
+</file>
+
+<file path=ppt/slides/slide3.xml><?xml version="1.0" encoding="utf-8"?>
+<p:sld xmlns:a="http://schemas.openxmlformats.org/drawingml/2006/main" xmlns:r="http://schemas.openxmlformats.org/officeDocument/2006/relationships" xmlns:p="http://schemas.openxmlformats.org/presentationml/2006/main">
+  <p:cSld>
+    <p:spTree>
+      <p:nvGrpSpPr>
+        <p:cNvPr id="1" name=""/>
+        <p:cNvGrpSpPr/>
+        <p:nvPr/>
+      </p:nvGrpSpPr>
+      <p:grpSpPr>
+        <a:xfrm>
+          <a:off x="0" y="0"/>
+          <a:ext cx="0" cy="0"/>
+          <a:chOff x="0" y="0"/>
+          <a:chExt cx="0" cy="0"/>
+        </a:xfrm>
+      </p:grpSpPr>
+      <p:sp>
+        <p:nvSpPr>
+          <p:cNvPr id="2" name="Titre 1"/>
+          <p:cNvSpPr>
+            <a:spLocks noGrp="1"/>
+          </p:cNvSpPr>
+          <p:nvPr>
+            <p:ph type="title"/>
+          </p:nvPr>
+        </p:nvSpPr>
+        <p:spPr/>
+        <p:txBody>
+          <a:bodyPr/>
+          <a:lstStyle/>
+          <a:p>
+            <a:r>
+              <a:rPr lang="fr-FR" dirty="0" err="1" smtClean="0"/>
+              <a:t>Context</a:t>
+            </a:r>
+            <a:endParaRPr lang="fr-FR" dirty="0"/>
+          </a:p>
+        </p:txBody>
+      </p:sp>
+      <p:sp>
+        <p:nvSpPr>
+          <p:cNvPr id="3" name="Espace réservé du contenu 2"/>
+          <p:cNvSpPr>
+            <a:spLocks noGrp="1"/>
+          </p:cNvSpPr>
+          <p:nvPr>
+            <p:ph idx="1"/>
+          </p:nvPr>
+        </p:nvSpPr>
+        <p:spPr/>
+        <p:txBody>
+          <a:bodyPr/>
+          <a:lstStyle/>
+          <a:p>
+            <a:r>
+              <a:rPr lang="fr-FR" dirty="0" err="1" smtClean="0"/>
+              <a:t>Need</a:t>
+            </a:r>
+            <a:r>
+              <a:rPr lang="fr-FR" dirty="0" smtClean="0"/>
+              <a:t> of a simple interface for </a:t>
+            </a:r>
+            <a:r>
+              <a:rPr lang="fr-FR" dirty="0" err="1" smtClean="0"/>
+              <a:t>disabled</a:t>
+            </a:r>
+            <a:r>
+              <a:rPr lang="fr-FR" dirty="0" smtClean="0"/>
+              <a:t> people</a:t>
+            </a:r>
+          </a:p>
+          <a:p>
+            <a:r>
+              <a:rPr lang="fr-FR" dirty="0" err="1" smtClean="0"/>
+              <a:t>Existing</a:t>
+            </a:r>
+            <a:r>
+              <a:rPr lang="fr-FR" dirty="0" smtClean="0"/>
+              <a:t> solutions but </a:t>
+            </a:r>
+            <a:r>
+              <a:rPr lang="fr-FR" dirty="0" err="1" smtClean="0"/>
+              <a:t>too</a:t>
+            </a:r>
+            <a:r>
+              <a:rPr lang="fr-FR" dirty="0" smtClean="0"/>
+              <a:t> </a:t>
+            </a:r>
+            <a:r>
+              <a:rPr lang="fr-FR" dirty="0" err="1" smtClean="0"/>
+              <a:t>complex</a:t>
+            </a:r>
+            <a:r>
+              <a:rPr lang="fr-FR" dirty="0" smtClean="0"/>
+              <a:t> and </a:t>
+            </a:r>
+            <a:r>
+              <a:rPr lang="fr-FR" dirty="0" err="1" smtClean="0"/>
+              <a:t>inadapted</a:t>
+            </a:r>
+            <a:endParaRPr lang="fr-FR" dirty="0" smtClean="0"/>
+          </a:p>
+          <a:p>
+            <a:r>
+              <a:rPr lang="fr-FR" dirty="0" err="1" smtClean="0"/>
+              <a:t>Knowledge</a:t>
+            </a:r>
+            <a:r>
+              <a:rPr lang="fr-FR" dirty="0" smtClean="0"/>
+              <a:t> </a:t>
+            </a:r>
+            <a:r>
+              <a:rPr lang="fr-FR" dirty="0" err="1" smtClean="0"/>
+              <a:t>transfer</a:t>
+            </a:r>
+            <a:r>
+              <a:rPr lang="fr-FR" dirty="0" smtClean="0"/>
+              <a:t> </a:t>
+            </a:r>
+            <a:r>
+              <a:rPr lang="fr-FR" dirty="0" err="1" smtClean="0"/>
+              <a:t>from</a:t>
+            </a:r>
+            <a:r>
+              <a:rPr lang="fr-FR" dirty="0" smtClean="0"/>
+              <a:t> </a:t>
+            </a:r>
+            <a:r>
+              <a:rPr lang="fr-FR" dirty="0" err="1" smtClean="0"/>
+              <a:t>Insa</a:t>
+            </a:r>
+            <a:r>
+              <a:rPr lang="fr-FR" dirty="0" smtClean="0"/>
+              <a:t> to </a:t>
+            </a:r>
+            <a:r>
+              <a:rPr lang="fr-FR" dirty="0" err="1" smtClean="0"/>
+              <a:t>Ergovie</a:t>
+            </a:r>
+            <a:endParaRPr lang="fr-FR" dirty="0" smtClean="0"/>
+          </a:p>
+          <a:p>
+            <a:r>
+              <a:rPr lang="fr-FR" dirty="0" err="1" smtClean="0"/>
+              <a:t>Ergovie</a:t>
+            </a:r>
+            <a:r>
+              <a:rPr lang="fr-FR" dirty="0" smtClean="0"/>
+              <a:t> </a:t>
+            </a:r>
+            <a:r>
+              <a:rPr lang="fr-FR" dirty="0" err="1" smtClean="0"/>
+              <a:t>is</a:t>
+            </a:r>
+            <a:r>
+              <a:rPr lang="fr-FR" dirty="0" smtClean="0"/>
+              <a:t> a Breton society </a:t>
+            </a:r>
+            <a:r>
+              <a:rPr lang="fr-FR" dirty="0" err="1" smtClean="0"/>
+              <a:t>who</a:t>
+            </a:r>
+            <a:r>
+              <a:rPr lang="fr-FR" dirty="0" smtClean="0"/>
+              <a:t> </a:t>
+            </a:r>
+            <a:r>
+              <a:rPr lang="fr-FR" dirty="0" err="1" smtClean="0"/>
+              <a:t>sells</a:t>
+            </a:r>
+            <a:r>
+              <a:rPr lang="fr-FR" dirty="0" smtClean="0"/>
+              <a:t> and </a:t>
+            </a:r>
+            <a:r>
+              <a:rPr lang="fr-FR" dirty="0" err="1" smtClean="0"/>
+              <a:t>repairs</a:t>
+            </a:r>
+            <a:r>
+              <a:rPr lang="fr-FR" dirty="0" smtClean="0"/>
+              <a:t> </a:t>
+            </a:r>
+            <a:r>
+              <a:rPr lang="fr-FR" dirty="0" err="1" smtClean="0"/>
+              <a:t>wheelchairs</a:t>
+            </a:r>
+            <a:r>
+              <a:rPr lang="fr-FR" dirty="0" smtClean="0"/>
+              <a:t>. </a:t>
+            </a:r>
+            <a:r>
+              <a:rPr lang="fr-FR" dirty="0" err="1" smtClean="0"/>
+              <a:t>They</a:t>
+            </a:r>
+            <a:r>
+              <a:rPr lang="fr-FR" dirty="0" smtClean="0"/>
+              <a:t> </a:t>
+            </a:r>
+            <a:r>
+              <a:rPr lang="fr-FR" dirty="0" err="1" smtClean="0"/>
+              <a:t>recently</a:t>
+            </a:r>
+            <a:r>
+              <a:rPr lang="fr-FR" dirty="0" smtClean="0"/>
+              <a:t> </a:t>
+            </a:r>
+            <a:r>
+              <a:rPr lang="fr-FR" dirty="0" err="1" smtClean="0"/>
+              <a:t>begin</a:t>
+            </a:r>
+            <a:r>
+              <a:rPr lang="fr-FR" dirty="0" smtClean="0"/>
+              <a:t> to </a:t>
+            </a:r>
+            <a:r>
+              <a:rPr lang="fr-FR" dirty="0" err="1" smtClean="0"/>
+              <a:t>develop</a:t>
+            </a:r>
+            <a:r>
+              <a:rPr lang="fr-FR" dirty="0" smtClean="0"/>
+              <a:t> </a:t>
+            </a:r>
+            <a:r>
+              <a:rPr lang="fr-FR" dirty="0" err="1" smtClean="0"/>
+              <a:t>domotic</a:t>
+            </a:r>
+            <a:r>
+              <a:rPr lang="fr-FR" dirty="0" smtClean="0"/>
+              <a:t> solutions.</a:t>
+            </a:r>
+            <a:endParaRPr lang="fr-FR" dirty="0"/>
+          </a:p>
+        </p:txBody>
+      </p:sp>
+    </p:spTree>
+    <p:extLst>
+      <p:ext uri="{BB962C8B-B14F-4D97-AF65-F5344CB8AC3E}">
+        <p14:creationId xmlns:p14="http://schemas.microsoft.com/office/powerpoint/2010/main" val="2323938747"/>
+      </p:ext>
+    </p:extLst>
+  </p:cSld>
+  <p:clrMapOvr>
+    <a:masterClrMapping/>
+  </p:clrMapOvr>
+</p:sld>
+</file>
+
+<file path=ppt/slides/slide4.xml><?xml version="1.0" encoding="utf-8"?>
+<p:sld xmlns:a="http://schemas.openxmlformats.org/drawingml/2006/main" xmlns:r="http://schemas.openxmlformats.org/officeDocument/2006/relationships" xmlns:p="http://schemas.openxmlformats.org/presentationml/2006/main">
+  <p:cSld>
+    <p:spTree>
+      <p:nvGrpSpPr>
+        <p:cNvPr id="1" name=""/>
+        <p:cNvGrpSpPr/>
+        <p:nvPr/>
+      </p:nvGrpSpPr>
+      <p:grpSpPr>
+        <a:xfrm>
+          <a:off x="0" y="0"/>
+          <a:ext cx="0" cy="0"/>
+          <a:chOff x="0" y="0"/>
+          <a:chExt cx="0" cy="0"/>
+        </a:xfrm>
+      </p:grpSpPr>
+      <p:sp>
+        <p:nvSpPr>
+          <p:cNvPr id="2" name="Titre 1"/>
+          <p:cNvSpPr>
+            <a:spLocks noGrp="1"/>
+          </p:cNvSpPr>
+          <p:nvPr>
+            <p:ph type="title"/>
+          </p:nvPr>
+        </p:nvSpPr>
+        <p:spPr/>
+        <p:txBody>
+          <a:bodyPr/>
+          <a:lstStyle/>
+          <a:p>
+            <a:r>
+              <a:rPr lang="fr-FR" dirty="0" err="1" smtClean="0"/>
+              <a:t>Pre-study</a:t>
+            </a:r>
+            <a:endParaRPr lang="fr-FR" dirty="0"/>
+          </a:p>
+        </p:txBody>
+      </p:sp>
+      <p:sp>
+        <p:nvSpPr>
+          <p:cNvPr id="3" name="Espace réservé du contenu 2"/>
+          <p:cNvSpPr>
+            <a:spLocks noGrp="1"/>
+          </p:cNvSpPr>
+          <p:nvPr>
+            <p:ph idx="1"/>
+          </p:nvPr>
+        </p:nvSpPr>
+        <p:spPr/>
+        <p:txBody>
+          <a:bodyPr/>
+          <a:lstStyle/>
+          <a:p>
+            <a:r>
+              <a:rPr lang="fr-FR" dirty="0" smtClean="0"/>
+              <a:t>Interface in </a:t>
+            </a:r>
+            <a:r>
+              <a:rPr lang="fr-FR" dirty="0" err="1" smtClean="0"/>
+              <a:t>XaML</a:t>
+            </a:r>
+            <a:r>
+              <a:rPr lang="fr-FR" dirty="0" smtClean="0"/>
+              <a:t>, C#</a:t>
+            </a:r>
+          </a:p>
+          <a:p>
+            <a:r>
+              <a:rPr lang="fr-FR" dirty="0" err="1" smtClean="0"/>
+              <a:t>Algorithm</a:t>
+            </a:r>
+            <a:r>
+              <a:rPr lang="fr-FR" dirty="0" smtClean="0"/>
+              <a:t> in C++</a:t>
+            </a:r>
+          </a:p>
+          <a:p>
+            <a:r>
+              <a:rPr lang="fr-FR" dirty="0" smtClean="0"/>
+              <a:t>API to control </a:t>
+            </a:r>
+            <a:r>
+              <a:rPr lang="fr-FR" dirty="0" err="1" smtClean="0"/>
+              <a:t>Kira</a:t>
+            </a:r>
+            <a:r>
+              <a:rPr lang="fr-FR" dirty="0" smtClean="0"/>
+              <a:t> : (</a:t>
+            </a:r>
+            <a:r>
+              <a:rPr lang="fr-FR" dirty="0" err="1" smtClean="0"/>
+              <a:t>protocol</a:t>
+            </a:r>
+            <a:r>
+              <a:rPr lang="fr-FR" dirty="0" smtClean="0"/>
+              <a:t> HTTP)</a:t>
+            </a:r>
+          </a:p>
+          <a:p>
+            <a:r>
+              <a:rPr lang="fr-FR" dirty="0" smtClean="0"/>
+              <a:t>API to control </a:t>
+            </a:r>
+            <a:r>
+              <a:rPr lang="fr-FR" dirty="0" err="1" smtClean="0"/>
+              <a:t>Fibaro</a:t>
+            </a:r>
+            <a:r>
+              <a:rPr lang="fr-FR" dirty="0" smtClean="0"/>
+              <a:t> : (</a:t>
+            </a:r>
+            <a:r>
+              <a:rPr lang="fr-FR" dirty="0" err="1" smtClean="0"/>
+              <a:t>protocol</a:t>
+            </a:r>
+            <a:r>
+              <a:rPr lang="fr-FR" dirty="0" smtClean="0"/>
+              <a:t> HTTP)</a:t>
+            </a:r>
+          </a:p>
+          <a:p>
+            <a:r>
+              <a:rPr lang="fr-FR" smtClean="0"/>
+              <a:t>API Bluetooth :</a:t>
+            </a:r>
+            <a:endParaRPr lang="fr-FR" dirty="0"/>
+          </a:p>
+        </p:txBody>
+      </p:sp>
+    </p:spTree>
+    <p:extLst>
+      <p:ext uri="{BB962C8B-B14F-4D97-AF65-F5344CB8AC3E}">
+        <p14:creationId xmlns:p14="http://schemas.microsoft.com/office/powerpoint/2010/main" val="3878288071"/>
+      </p:ext>
+    </p:extLst>
+  </p:cSld>
+  <p:clrMapOvr>
+    <a:masterClrMapping/>
+  </p:clrMapOvr>
+</p:sld>
+</file>
+
+<file path=ppt/slides/slide5.xml><?xml version="1.0" encoding="utf-8"?>
 <p:sld xmlns:a="http://schemas.openxmlformats.org/drawingml/2006/main" xmlns:r="http://schemas.openxmlformats.org/officeDocument/2006/relationships" xmlns:p="http://schemas.openxmlformats.org/presentationml/2006/main">
   <p:cSld>
     <p:spTree>
@@ -4365,7 +4886,7 @@
 </p:sld>
 </file>
 
-<file path=ppt/slides/slide3.xml><?xml version="1.0" encoding="utf-8"?>
+<file path=ppt/slides/slide6.xml><?xml version="1.0" encoding="utf-8"?>
 <p:sld xmlns:a="http://schemas.openxmlformats.org/drawingml/2006/main" xmlns:r="http://schemas.openxmlformats.org/officeDocument/2006/relationships" xmlns:p="http://schemas.openxmlformats.org/presentationml/2006/main">
   <p:cSld>
     <p:spTree>
@@ -4854,6 +5375,155 @@
 </p:sld>
 </file>
 
+<file path=ppt/slides/slide7.xml><?xml version="1.0" encoding="utf-8"?>
+<p:sld xmlns:a="http://schemas.openxmlformats.org/drawingml/2006/main" xmlns:r="http://schemas.openxmlformats.org/officeDocument/2006/relationships" xmlns:p="http://schemas.openxmlformats.org/presentationml/2006/main">
+  <p:cSld>
+    <p:spTree>
+      <p:nvGrpSpPr>
+        <p:cNvPr id="1" name=""/>
+        <p:cNvGrpSpPr/>
+        <p:nvPr/>
+      </p:nvGrpSpPr>
+      <p:grpSpPr>
+        <a:xfrm>
+          <a:off x="0" y="0"/>
+          <a:ext cx="0" cy="0"/>
+          <a:chOff x="0" y="0"/>
+          <a:chExt cx="0" cy="0"/>
+        </a:xfrm>
+      </p:grpSpPr>
+      <p:sp>
+        <p:nvSpPr>
+          <p:cNvPr id="4" name="Titre 3"/>
+          <p:cNvSpPr>
+            <a:spLocks noGrp="1"/>
+          </p:cNvSpPr>
+          <p:nvPr>
+            <p:ph type="title"/>
+          </p:nvPr>
+        </p:nvSpPr>
+        <p:spPr/>
+        <p:txBody>
+          <a:bodyPr/>
+          <a:lstStyle/>
+          <a:p>
+            <a:r>
+              <a:rPr lang="fr-FR" dirty="0" err="1" smtClean="0"/>
+              <a:t>Specifications</a:t>
+            </a:r>
+            <a:endParaRPr lang="fr-FR" dirty="0"/>
+          </a:p>
+        </p:txBody>
+      </p:sp>
+      <p:sp>
+        <p:nvSpPr>
+          <p:cNvPr id="5" name="Espace réservé du contenu 4"/>
+          <p:cNvSpPr>
+            <a:spLocks noGrp="1"/>
+          </p:cNvSpPr>
+          <p:nvPr>
+            <p:ph idx="1"/>
+          </p:nvPr>
+        </p:nvSpPr>
+        <p:spPr/>
+        <p:txBody>
+          <a:bodyPr/>
+          <a:lstStyle/>
+          <a:p>
+            <a:r>
+              <a:rPr lang="fr-FR" dirty="0" err="1" smtClean="0"/>
+              <a:t>Enabling</a:t>
+            </a:r>
+            <a:r>
+              <a:rPr lang="fr-FR" dirty="0" smtClean="0"/>
+              <a:t> people to switch on/off machines</a:t>
+            </a:r>
+          </a:p>
+          <a:p>
+            <a:r>
+              <a:rPr lang="fr-FR" dirty="0" err="1" smtClean="0"/>
+              <a:t>Adapted</a:t>
+            </a:r>
+            <a:r>
+              <a:rPr lang="fr-FR" dirty="0" smtClean="0"/>
+              <a:t> to </a:t>
+            </a:r>
+            <a:r>
+              <a:rPr lang="fr-FR" dirty="0" err="1" smtClean="0"/>
+              <a:t>users</a:t>
+            </a:r>
+            <a:endParaRPr lang="fr-FR" dirty="0" smtClean="0"/>
+          </a:p>
+          <a:p>
+            <a:r>
+              <a:rPr lang="fr-FR" dirty="0" smtClean="0"/>
+              <a:t>A « scrolling » mode (traduction à revoir)</a:t>
+            </a:r>
+          </a:p>
+          <a:p>
+            <a:r>
+              <a:rPr lang="fr-FR" dirty="0" smtClean="0"/>
+              <a:t>Configuration </a:t>
+            </a:r>
+            <a:r>
+              <a:rPr lang="fr-FR" dirty="0" err="1" smtClean="0"/>
+              <a:t>available</a:t>
+            </a:r>
+            <a:r>
+              <a:rPr lang="fr-FR" dirty="0" smtClean="0"/>
+              <a:t>, </a:t>
+            </a:r>
+            <a:r>
+              <a:rPr lang="fr-FR" dirty="0" err="1" smtClean="0"/>
+              <a:t>only</a:t>
+            </a:r>
+            <a:r>
+              <a:rPr lang="fr-FR" dirty="0" smtClean="0"/>
+              <a:t> for </a:t>
+            </a:r>
+            <a:r>
+              <a:rPr lang="fr-FR" dirty="0" err="1" smtClean="0"/>
+              <a:t>technician</a:t>
+            </a:r>
+            <a:endParaRPr lang="fr-FR" dirty="0" smtClean="0"/>
+          </a:p>
+          <a:p>
+            <a:r>
+              <a:rPr lang="fr-FR" dirty="0" smtClean="0"/>
+              <a:t>Feedback </a:t>
+            </a:r>
+            <a:r>
+              <a:rPr lang="fr-FR" dirty="0" err="1" smtClean="0"/>
+              <a:t>from</a:t>
+            </a:r>
+            <a:r>
+              <a:rPr lang="fr-FR" dirty="0" smtClean="0"/>
+              <a:t> the </a:t>
+            </a:r>
+            <a:r>
+              <a:rPr lang="fr-FR" dirty="0" err="1" smtClean="0"/>
+              <a:t>wheelchair</a:t>
+            </a:r>
+            <a:endParaRPr lang="fr-FR" dirty="0" smtClean="0"/>
+          </a:p>
+          <a:p>
+            <a:endParaRPr lang="fr-FR" dirty="0"/>
+          </a:p>
+        </p:txBody>
+      </p:sp>
+    </p:spTree>
+    <p:extLst>
+      <p:ext uri="{BB962C8B-B14F-4D97-AF65-F5344CB8AC3E}">
+        <p14:creationId xmlns:p14="http://schemas.microsoft.com/office/powerpoint/2010/main" val="2041247489"/>
+      </p:ext>
+    </p:extLst>
+  </p:cSld>
+  <p:clrMapOvr>
+    <a:masterClrMapping/>
+  </p:clrMapOvr>
+</p:sld>
+</file>
+
 <file path=ppt/theme/theme1.xml><?xml version="1.0" encoding="utf-8"?>
 <a:theme xmlns:a="http://schemas.openxmlformats.org/drawingml/2006/main" name="Thème Office">
   <a:themeElements>
@@ -5109,7 +5779,7 @@
   <a:extraClrSchemeLst/>
   <a:extLst>
     <a:ext uri="{05A4C25C-085E-4340-85A3-A5531E510DB2}">
-      <thm15:themeFamily xmlns="" xmlns:thm15="http://schemas.microsoft.com/office/thememl/2012/main" name="Office Theme" id="{62F939B6-93AF-4DB8-9C6B-D6C7DFDC589F}" vid="{4A3C46E8-61CC-4603-A589-7422A47A8E4A}"/>
+      <thm15:themeFamily xmlns:thm15="http://schemas.microsoft.com/office/thememl/2012/main" name="Office Theme" id="{62F939B6-93AF-4DB8-9C6B-D6C7DFDC589F}" vid="{4A3C46E8-61CC-4603-A589-7422A47A8E4A}"/>
     </a:ext>
   </a:extLst>
 </a:theme>

</xml_diff>

<commit_message>
Modif diapo - ajout de parties
</commit_message>
<xml_diff>
--- a/Rendu/Diapo_prototype_janvier.pptx
+++ b/Rendu/Diapo_prototype_janvier.pptx
@@ -5,19 +5,28 @@
     <p:sldMasterId id="2147483648" r:id="rId1"/>
   </p:sldMasterIdLst>
   <p:notesMasterIdLst>
-    <p:notesMasterId r:id="rId9"/>
+    <p:notesMasterId r:id="rId18"/>
   </p:notesMasterIdLst>
   <p:handoutMasterIdLst>
-    <p:handoutMasterId r:id="rId10"/>
+    <p:handoutMasterId r:id="rId19"/>
   </p:handoutMasterIdLst>
   <p:sldIdLst>
     <p:sldId id="284" r:id="rId2"/>
     <p:sldId id="287" r:id="rId3"/>
     <p:sldId id="288" r:id="rId4"/>
-    <p:sldId id="289" r:id="rId5"/>
-    <p:sldId id="285" r:id="rId6"/>
-    <p:sldId id="286" r:id="rId7"/>
-    <p:sldId id="290" r:id="rId8"/>
+    <p:sldId id="291" r:id="rId5"/>
+    <p:sldId id="292" r:id="rId6"/>
+    <p:sldId id="293" r:id="rId7"/>
+    <p:sldId id="295" r:id="rId8"/>
+    <p:sldId id="290" r:id="rId9"/>
+    <p:sldId id="294" r:id="rId10"/>
+    <p:sldId id="289" r:id="rId11"/>
+    <p:sldId id="296" r:id="rId12"/>
+    <p:sldId id="285" r:id="rId13"/>
+    <p:sldId id="286" r:id="rId14"/>
+    <p:sldId id="298" r:id="rId15"/>
+    <p:sldId id="297" r:id="rId16"/>
+    <p:sldId id="299" r:id="rId17"/>
   </p:sldIdLst>
   <p:sldSz cx="9144000" cy="5143500" type="screen16x9"/>
   <p:notesSz cx="6799263" cy="9929813"/>
@@ -6939,7 +6948,7 @@
 </p:sld>
 </file>
 
-<file path=ppt/slides/slide2.xml><?xml version="1.0" encoding="utf-8"?>
+<file path=ppt/slides/slide10.xml><?xml version="1.0" encoding="utf-8"?>
 <p:sld xmlns:a="http://schemas.openxmlformats.org/drawingml/2006/main" xmlns:r="http://schemas.openxmlformats.org/officeDocument/2006/relationships" xmlns:p="http://schemas.openxmlformats.org/presentationml/2006/main">
   <p:cSld>
     <p:spTree>
@@ -6973,8 +6982,8 @@
           <a:p>
             <a:pPr algn="ctr"/>
             <a:r>
-              <a:rPr lang="fr-FR" dirty="0" smtClean="0"/>
-              <a:t>Contents</a:t>
+              <a:rPr lang="fr-FR" dirty="0" err="1" smtClean="0"/>
+              <a:t>Pre-study</a:t>
             </a:r>
             <a:endParaRPr lang="fr-FR" dirty="0"/>
           </a:p>
@@ -7003,56 +7012,97 @@
           <a:bodyPr/>
           <a:lstStyle/>
           <a:p>
+            <a:r>
+              <a:rPr lang="fr-FR" dirty="0" smtClean="0"/>
+              <a:t>Interface in </a:t>
+            </a:r>
+            <a:r>
+              <a:rPr lang="fr-FR" dirty="0" err="1" smtClean="0"/>
+              <a:t>XaML</a:t>
+            </a:r>
+            <a:r>
+              <a:rPr lang="fr-FR" dirty="0" smtClean="0"/>
+              <a:t>, C#</a:t>
+            </a:r>
+          </a:p>
+          <a:p>
+            <a:r>
+              <a:rPr lang="fr-FR" dirty="0" smtClean="0"/>
+              <a:t>Model made</a:t>
+            </a:r>
+            <a:r>
+              <a:rPr lang="fr-FR" dirty="0" smtClean="0"/>
+              <a:t> </a:t>
+            </a:r>
+            <a:r>
+              <a:rPr lang="fr-FR" dirty="0" smtClean="0"/>
+              <a:t>in C++</a:t>
+            </a:r>
+          </a:p>
+          <a:p>
+            <a:r>
+              <a:rPr lang="fr-FR" dirty="0" smtClean="0"/>
+              <a:t>API to control </a:t>
+            </a:r>
+            <a:r>
+              <a:rPr lang="fr-FR" dirty="0" err="1" smtClean="0"/>
+              <a:t>Kira</a:t>
+            </a:r>
+            <a:r>
+              <a:rPr lang="fr-FR" dirty="0" smtClean="0"/>
+              <a:t> : </a:t>
+            </a:r>
+            <a:r>
+              <a:rPr lang="fr-FR" dirty="0" err="1" smtClean="0"/>
+              <a:t>HappyHttp</a:t>
+            </a:r>
+            <a:r>
+              <a:rPr lang="fr-FR" dirty="0" smtClean="0"/>
+              <a:t> (HTTP </a:t>
+            </a:r>
+            <a:r>
+              <a:rPr lang="fr-FR" dirty="0" err="1" smtClean="0"/>
+              <a:t>protocol</a:t>
+            </a:r>
+            <a:r>
+              <a:rPr lang="fr-FR" dirty="0" smtClean="0"/>
+              <a:t>)</a:t>
+            </a:r>
             <a:endParaRPr lang="fr-FR" dirty="0" smtClean="0"/>
           </a:p>
           <a:p>
-            <a:pPr marL="0" indent="0">
-              <a:buNone/>
-            </a:pPr>
             <a:r>
               <a:rPr lang="fr-FR" dirty="0" smtClean="0"/>
-              <a:t>• </a:t>
+              <a:t>API to control </a:t>
             </a:r>
             <a:r>
               <a:rPr lang="fr-FR" dirty="0" err="1" smtClean="0"/>
-              <a:t>Context</a:t>
-            </a:r>
-            <a:endParaRPr lang="fr-FR" dirty="0" smtClean="0"/>
-          </a:p>
-          <a:p>
-            <a:pPr marL="0" indent="0">
-              <a:buNone/>
-            </a:pPr>
+              <a:t>Fibaro</a:t>
+            </a:r>
             <a:r>
               <a:rPr lang="fr-FR" dirty="0" smtClean="0"/>
-              <a:t>• </a:t>
+              <a:t> : </a:t>
+            </a:r>
+            <a:r>
+              <a:rPr lang="fr-FR" dirty="0" smtClean="0"/>
+              <a:t>(HTTP </a:t>
             </a:r>
             <a:r>
               <a:rPr lang="fr-FR" dirty="0" err="1" smtClean="0"/>
-              <a:t>Pre-study</a:t>
-            </a:r>
-            <a:endParaRPr lang="fr-FR" dirty="0" smtClean="0"/>
-          </a:p>
-          <a:p>
-            <a:pPr marL="0" indent="0">
-              <a:buNone/>
-            </a:pPr>
+              <a:t>protocol</a:t>
+            </a:r>
             <a:r>
               <a:rPr lang="fr-FR" dirty="0" smtClean="0"/>
-              <a:t>• </a:t>
-            </a:r>
-            <a:r>
-              <a:rPr lang="fr-FR" dirty="0" err="1" smtClean="0"/>
-              <a:t>Specifications</a:t>
-            </a:r>
-            <a:endParaRPr lang="fr-FR" dirty="0" smtClean="0"/>
+              <a:t>)</a:t>
+            </a:r>
+            <a:endParaRPr lang="fr-FR" dirty="0"/>
           </a:p>
         </p:txBody>
       </p:sp>
     </p:spTree>
     <p:extLst>
       <p:ext uri="{BB962C8B-B14F-4D97-AF65-F5344CB8AC3E}">
-        <p14:creationId xmlns:p14="http://schemas.microsoft.com/office/powerpoint/2010/main" val="3396826098"/>
+        <p14:creationId xmlns:p14="http://schemas.microsoft.com/office/powerpoint/2010/main" val="557608675"/>
       </p:ext>
     </p:extLst>
   </p:cSld>
@@ -7074,7 +7124,7 @@
 </p:sld>
 </file>
 
-<file path=ppt/slides/slide3.xml><?xml version="1.0" encoding="utf-8"?>
+<file path=ppt/slides/slide11.xml><?xml version="1.0" encoding="utf-8"?>
 <p:sld xmlns:a="http://schemas.openxmlformats.org/drawingml/2006/main" xmlns:r="http://schemas.openxmlformats.org/officeDocument/2006/relationships" xmlns:p="http://schemas.openxmlformats.org/presentationml/2006/main">
   <p:cSld>
     <p:spTree>
@@ -7109,7 +7159,7 @@
             <a:pPr algn="ctr"/>
             <a:r>
               <a:rPr lang="fr-FR" dirty="0" err="1" smtClean="0"/>
-              <a:t>Context</a:t>
+              <a:t>Pre-study</a:t>
             </a:r>
             <a:endParaRPr lang="fr-FR" dirty="0"/>
           </a:p>
@@ -7117,224 +7167,93 @@
       </p:sp>
       <p:sp>
         <p:nvSpPr>
-          <p:cNvPr id="3" name="Espace réservé du contenu 2"/>
+          <p:cNvPr id="3" name="Espace réservé du texte 2"/>
           <p:cNvSpPr>
             <a:spLocks noGrp="1"/>
           </p:cNvSpPr>
           <p:nvPr>
-            <p:ph idx="4294967295"/>
+            <p:ph type="body" sz="quarter" idx="10"/>
           </p:nvPr>
         </p:nvSpPr>
-        <p:spPr>
-          <a:xfrm>
-            <a:off x="628650" y="1369219"/>
-            <a:ext cx="7886700" cy="3263504"/>
-          </a:xfrm>
-          <a:prstGeom prst="rect">
-            <a:avLst/>
-          </a:prstGeom>
-        </p:spPr>
+        <p:spPr/>
         <p:txBody>
           <a:bodyPr/>
           <a:lstStyle/>
           <a:p>
             <a:r>
               <a:rPr lang="fr-FR" dirty="0" err="1" smtClean="0"/>
-              <a:t>Need</a:t>
+              <a:t>Programming</a:t>
+            </a:r>
+            <a:endParaRPr lang="fr-FR" dirty="0" smtClean="0"/>
+          </a:p>
+          <a:p>
+            <a:pPr marL="0" indent="0">
+              <a:buNone/>
+            </a:pPr>
+            <a:r>
+              <a:rPr lang="fr-FR" dirty="0"/>
+              <a:t>	</a:t>
             </a:r>
             <a:r>
               <a:rPr lang="fr-FR" dirty="0" smtClean="0"/>
-              <a:t> of a simple interface for </a:t>
-            </a:r>
+              <a:t>Visual </a:t>
+            </a:r>
+            <a:r>
+              <a:rPr lang="fr-FR" dirty="0"/>
+              <a:t>Studio</a:t>
+            </a:r>
+          </a:p>
+          <a:p>
+            <a:endParaRPr lang="fr-FR" dirty="0" smtClean="0"/>
+          </a:p>
+          <a:p>
             <a:r>
               <a:rPr lang="fr-FR" dirty="0" err="1" smtClean="0"/>
-              <a:t>disabled</a:t>
+              <a:t>Versioning</a:t>
+            </a:r>
+            <a:endParaRPr lang="fr-FR" dirty="0" smtClean="0"/>
+          </a:p>
+          <a:p>
+            <a:pPr marL="0" indent="0">
+              <a:buNone/>
+            </a:pPr>
+            <a:r>
+              <a:rPr lang="fr-FR" dirty="0"/>
+              <a:t>	</a:t>
             </a:r>
             <a:r>
               <a:rPr lang="fr-FR" dirty="0" smtClean="0"/>
-              <a:t> people</a:t>
-            </a:r>
-          </a:p>
-          <a:p>
-            <a:r>
-              <a:rPr lang="fr-FR" dirty="0" err="1" smtClean="0"/>
-              <a:t>Existing</a:t>
-            </a:r>
-            <a:r>
-              <a:rPr lang="fr-FR" dirty="0" smtClean="0"/>
-              <a:t> solutions but </a:t>
-            </a:r>
-            <a:r>
-              <a:rPr lang="fr-FR" dirty="0" err="1" smtClean="0"/>
-              <a:t>too</a:t>
-            </a:r>
-            <a:r>
-              <a:rPr lang="fr-FR" dirty="0" smtClean="0"/>
-              <a:t> </a:t>
-            </a:r>
-            <a:r>
-              <a:rPr lang="fr-FR" dirty="0" err="1" smtClean="0"/>
-              <a:t>complex</a:t>
-            </a:r>
-            <a:r>
-              <a:rPr lang="fr-FR" dirty="0" smtClean="0"/>
-              <a:t> and </a:t>
-            </a:r>
-            <a:r>
-              <a:rPr lang="fr-FR" dirty="0" err="1" smtClean="0"/>
-              <a:t>inadapted</a:t>
-            </a:r>
-            <a:endParaRPr lang="fr-FR" dirty="0" smtClean="0"/>
-          </a:p>
-          <a:p>
-            <a:r>
-              <a:rPr lang="fr-FR" dirty="0" err="1" smtClean="0"/>
-              <a:t>Knowledge</a:t>
-            </a:r>
-            <a:r>
-              <a:rPr lang="fr-FR" dirty="0" smtClean="0"/>
-              <a:t> </a:t>
-            </a:r>
-            <a:r>
-              <a:rPr lang="fr-FR" dirty="0" err="1" smtClean="0"/>
-              <a:t>transfer</a:t>
-            </a:r>
-            <a:r>
-              <a:rPr lang="fr-FR" dirty="0" smtClean="0"/>
-              <a:t> </a:t>
-            </a:r>
-            <a:r>
-              <a:rPr lang="fr-FR" dirty="0" err="1" smtClean="0"/>
-              <a:t>from</a:t>
-            </a:r>
-            <a:r>
-              <a:rPr lang="fr-FR" dirty="0" smtClean="0"/>
-              <a:t> </a:t>
-            </a:r>
-            <a:r>
-              <a:rPr lang="fr-FR" dirty="0" err="1" smtClean="0"/>
-              <a:t>Insa</a:t>
-            </a:r>
-            <a:r>
-              <a:rPr lang="fr-FR" dirty="0" smtClean="0"/>
-              <a:t> to </a:t>
-            </a:r>
-            <a:r>
-              <a:rPr lang="fr-FR" dirty="0" err="1" smtClean="0"/>
-              <a:t>Ergovie</a:t>
-            </a:r>
-            <a:endParaRPr lang="fr-FR" dirty="0" smtClean="0"/>
-          </a:p>
-          <a:p>
-            <a:r>
-              <a:rPr lang="fr-FR" dirty="0" err="1" smtClean="0"/>
-              <a:t>Ergovie</a:t>
-            </a:r>
-            <a:r>
-              <a:rPr lang="fr-FR" dirty="0" smtClean="0"/>
-              <a:t> </a:t>
-            </a:r>
-            <a:r>
-              <a:rPr lang="fr-FR" dirty="0" err="1" smtClean="0"/>
-              <a:t>is</a:t>
-            </a:r>
-            <a:r>
-              <a:rPr lang="fr-FR" dirty="0" smtClean="0"/>
-              <a:t> a Breton society </a:t>
-            </a:r>
-            <a:r>
-              <a:rPr lang="fr-FR" dirty="0" err="1" smtClean="0"/>
-              <a:t>who</a:t>
-            </a:r>
-            <a:r>
-              <a:rPr lang="fr-FR" dirty="0" smtClean="0"/>
-              <a:t> </a:t>
-            </a:r>
-            <a:r>
-              <a:rPr lang="fr-FR" dirty="0" err="1" smtClean="0"/>
-              <a:t>sells</a:t>
-            </a:r>
-            <a:r>
-              <a:rPr lang="fr-FR" dirty="0" smtClean="0"/>
-              <a:t> and </a:t>
-            </a:r>
-            <a:r>
-              <a:rPr lang="fr-FR" dirty="0" err="1" smtClean="0"/>
-              <a:t>repairs</a:t>
-            </a:r>
-            <a:r>
-              <a:rPr lang="fr-FR" dirty="0" smtClean="0"/>
-              <a:t> </a:t>
-            </a:r>
-            <a:r>
-              <a:rPr lang="fr-FR" dirty="0" err="1" smtClean="0"/>
-              <a:t>wheelchairs</a:t>
-            </a:r>
-            <a:r>
-              <a:rPr lang="fr-FR" dirty="0" smtClean="0"/>
-              <a:t>. </a:t>
-            </a:r>
-            <a:r>
-              <a:rPr lang="fr-FR" dirty="0" err="1" smtClean="0"/>
-              <a:t>They</a:t>
-            </a:r>
-            <a:r>
-              <a:rPr lang="fr-FR" dirty="0" smtClean="0"/>
-              <a:t> </a:t>
-            </a:r>
-            <a:r>
-              <a:rPr lang="fr-FR" dirty="0" err="1" smtClean="0"/>
-              <a:t>recently</a:t>
-            </a:r>
-            <a:r>
-              <a:rPr lang="fr-FR" dirty="0" smtClean="0"/>
-              <a:t> </a:t>
-            </a:r>
-            <a:r>
-              <a:rPr lang="fr-FR" dirty="0" err="1" smtClean="0"/>
-              <a:t>begin</a:t>
-            </a:r>
-            <a:r>
-              <a:rPr lang="fr-FR" dirty="0" smtClean="0"/>
-              <a:t> to </a:t>
-            </a:r>
-            <a:r>
-              <a:rPr lang="fr-FR" dirty="0" err="1" smtClean="0"/>
-              <a:t>develop</a:t>
-            </a:r>
-            <a:r>
-              <a:rPr lang="fr-FR" dirty="0" smtClean="0"/>
-              <a:t> </a:t>
-            </a:r>
-            <a:r>
-              <a:rPr lang="fr-FR" dirty="0" err="1" smtClean="0"/>
-              <a:t>domotic</a:t>
-            </a:r>
-            <a:r>
-              <a:rPr lang="fr-FR" dirty="0" smtClean="0"/>
-              <a:t> solutions.</a:t>
-            </a:r>
-            <a:endParaRPr lang="fr-FR" dirty="0"/>
+              <a:t>Git</a:t>
+            </a:r>
+          </a:p>
+          <a:p>
+            <a:pPr marL="0" indent="0">
+              <a:buNone/>
+            </a:pPr>
+            <a:r>
+              <a:rPr lang="fr-FR" dirty="0"/>
+              <a:t>	</a:t>
+            </a:r>
           </a:p>
         </p:txBody>
       </p:sp>
     </p:spTree>
     <p:extLst>
       <p:ext uri="{BB962C8B-B14F-4D97-AF65-F5344CB8AC3E}">
-        <p14:creationId xmlns:p14="http://schemas.microsoft.com/office/powerpoint/2010/main" val="3570722297"/>
+        <p14:creationId xmlns:p14="http://schemas.microsoft.com/office/powerpoint/2010/main" val="423255876"/>
       </p:ext>
     </p:extLst>
   </p:cSld>
   <p:clrMapOvr>
     <a:masterClrMapping/>
   </p:clrMapOvr>
-  <mc:AlternateContent xmlns:mc="http://schemas.openxmlformats.org/markup-compatibility/2006" xmlns:p14="http://schemas.microsoft.com/office/powerpoint/2010/main">
-    <mc:Choice Requires="p14">
+  <mc:AlternateContent xmlns:mc="http://schemas.openxmlformats.org/markup-compatibility/2006">
+    <mc:Choice xmlns:p14="http://schemas.microsoft.com/office/powerpoint/2010/main" Requires="p14">
       <p:transition spd="med" p14:dur="700">
         <p:fade/>
       </p:transition>
     </mc:Choice>
-    <mc:Fallback xmlns="">
+    <mc:Fallback>
       <p:transition spd="med">
         <p:fade/>
       </p:transition>
@@ -7343,172 +7262,7 @@
 </p:sld>
 </file>
 
-<file path=ppt/slides/slide4.xml><?xml version="1.0" encoding="utf-8"?>
-<p:sld xmlns:a="http://schemas.openxmlformats.org/drawingml/2006/main" xmlns:r="http://schemas.openxmlformats.org/officeDocument/2006/relationships" xmlns:p="http://schemas.openxmlformats.org/presentationml/2006/main">
-  <p:cSld>
-    <p:spTree>
-      <p:nvGrpSpPr>
-        <p:cNvPr id="1" name=""/>
-        <p:cNvGrpSpPr/>
-        <p:nvPr/>
-      </p:nvGrpSpPr>
-      <p:grpSpPr>
-        <a:xfrm>
-          <a:off x="0" y="0"/>
-          <a:ext cx="0" cy="0"/>
-          <a:chOff x="0" y="0"/>
-          <a:chExt cx="0" cy="0"/>
-        </a:xfrm>
-      </p:grpSpPr>
-      <p:sp>
-        <p:nvSpPr>
-          <p:cNvPr id="2" name="Titre 1"/>
-          <p:cNvSpPr>
-            <a:spLocks noGrp="1"/>
-          </p:cNvSpPr>
-          <p:nvPr>
-            <p:ph type="title"/>
-          </p:nvPr>
-        </p:nvSpPr>
-        <p:spPr/>
-        <p:txBody>
-          <a:bodyPr/>
-          <a:lstStyle/>
-          <a:p>
-            <a:pPr algn="ctr"/>
-            <a:r>
-              <a:rPr lang="fr-FR" dirty="0" err="1" smtClean="0"/>
-              <a:t>Pre-study</a:t>
-            </a:r>
-            <a:endParaRPr lang="fr-FR" dirty="0"/>
-          </a:p>
-        </p:txBody>
-      </p:sp>
-      <p:sp>
-        <p:nvSpPr>
-          <p:cNvPr id="3" name="Espace réservé du contenu 2"/>
-          <p:cNvSpPr>
-            <a:spLocks noGrp="1"/>
-          </p:cNvSpPr>
-          <p:nvPr>
-            <p:ph idx="4294967295"/>
-          </p:nvPr>
-        </p:nvSpPr>
-        <p:spPr>
-          <a:xfrm>
-            <a:off x="628650" y="1369219"/>
-            <a:ext cx="7886700" cy="3263504"/>
-          </a:xfrm>
-          <a:prstGeom prst="rect">
-            <a:avLst/>
-          </a:prstGeom>
-        </p:spPr>
-        <p:txBody>
-          <a:bodyPr/>
-          <a:lstStyle/>
-          <a:p>
-            <a:r>
-              <a:rPr lang="fr-FR" dirty="0" smtClean="0"/>
-              <a:t>Interface in </a:t>
-            </a:r>
-            <a:r>
-              <a:rPr lang="fr-FR" dirty="0" err="1" smtClean="0"/>
-              <a:t>XaML</a:t>
-            </a:r>
-            <a:r>
-              <a:rPr lang="fr-FR" dirty="0" smtClean="0"/>
-              <a:t>, C#</a:t>
-            </a:r>
-          </a:p>
-          <a:p>
-            <a:r>
-              <a:rPr lang="fr-FR" dirty="0" err="1" smtClean="0"/>
-              <a:t>Algorithm</a:t>
-            </a:r>
-            <a:r>
-              <a:rPr lang="fr-FR" dirty="0" smtClean="0"/>
-              <a:t> in C++</a:t>
-            </a:r>
-          </a:p>
-          <a:p>
-            <a:r>
-              <a:rPr lang="fr-FR" dirty="0" smtClean="0"/>
-              <a:t>API to control </a:t>
-            </a:r>
-            <a:r>
-              <a:rPr lang="fr-FR" dirty="0" err="1" smtClean="0"/>
-              <a:t>Kira</a:t>
-            </a:r>
-            <a:r>
-              <a:rPr lang="fr-FR" dirty="0" smtClean="0"/>
-              <a:t> : (</a:t>
-            </a:r>
-            <a:r>
-              <a:rPr lang="fr-FR" dirty="0" err="1" smtClean="0"/>
-              <a:t>protocol</a:t>
-            </a:r>
-            <a:r>
-              <a:rPr lang="fr-FR" dirty="0" smtClean="0"/>
-              <a:t> HTTP)</a:t>
-            </a:r>
-          </a:p>
-          <a:p>
-            <a:r>
-              <a:rPr lang="fr-FR" dirty="0" smtClean="0"/>
-              <a:t>API to control </a:t>
-            </a:r>
-            <a:r>
-              <a:rPr lang="fr-FR" dirty="0" err="1" smtClean="0"/>
-              <a:t>Fibaro</a:t>
-            </a:r>
-            <a:r>
-              <a:rPr lang="fr-FR" dirty="0" smtClean="0"/>
-              <a:t> : (</a:t>
-            </a:r>
-            <a:r>
-              <a:rPr lang="fr-FR" dirty="0" err="1" smtClean="0"/>
-              <a:t>protocol</a:t>
-            </a:r>
-            <a:r>
-              <a:rPr lang="fr-FR" dirty="0" smtClean="0"/>
-              <a:t> HTTP)</a:t>
-            </a:r>
-          </a:p>
-          <a:p>
-            <a:r>
-              <a:rPr lang="fr-FR" smtClean="0"/>
-              <a:t>API Bluetooth :</a:t>
-            </a:r>
-            <a:endParaRPr lang="fr-FR" dirty="0"/>
-          </a:p>
-        </p:txBody>
-      </p:sp>
-    </p:spTree>
-    <p:extLst>
-      <p:ext uri="{BB962C8B-B14F-4D97-AF65-F5344CB8AC3E}">
-        <p14:creationId xmlns:p14="http://schemas.microsoft.com/office/powerpoint/2010/main" val="557608675"/>
-      </p:ext>
-    </p:extLst>
-  </p:cSld>
-  <p:clrMapOvr>
-    <a:masterClrMapping/>
-  </p:clrMapOvr>
-  <mc:AlternateContent xmlns:mc="http://schemas.openxmlformats.org/markup-compatibility/2006" xmlns:p14="http://schemas.microsoft.com/office/powerpoint/2010/main">
-    <mc:Choice Requires="p14">
-      <p:transition spd="med" p14:dur="700">
-        <p:fade/>
-      </p:transition>
-    </mc:Choice>
-    <mc:Fallback xmlns="">
-      <p:transition spd="med">
-        <p:fade/>
-      </p:transition>
-    </mc:Fallback>
-  </mc:AlternateContent>
-</p:sld>
-</file>
-
-<file path=ppt/slides/slide5.xml><?xml version="1.0" encoding="utf-8"?>
+<file path=ppt/slides/slide12.xml><?xml version="1.0" encoding="utf-8"?>
 <p:sld xmlns:a="http://schemas.openxmlformats.org/drawingml/2006/main" xmlns:r="http://schemas.openxmlformats.org/officeDocument/2006/relationships" xmlns:p="http://schemas.openxmlformats.org/presentationml/2006/main">
   <p:cSld>
     <p:spTree>
@@ -7583,7 +7337,7 @@
             <p:ph idx="4294967295"/>
             <p:extLst>
               <p:ext uri="{D42A27DB-BD31-4B8C-83A1-F6EECF244321}">
-                <p14:modId xmlns:p14="http://schemas.microsoft.com/office/powerpoint/2010/main" val="1084669368"/>
+                <p14:modId xmlns:p14="http://schemas.microsoft.com/office/powerpoint/2010/main" val="3807263653"/>
               </p:ext>
             </p:extLst>
           </p:nvPr>
@@ -7905,11 +7659,17 @@
                       </a:pPr>
                       <a:r>
                         <a:rPr lang="fr-FR" sz="1800" dirty="0">
+                          <a:solidFill>
+                            <a:srgbClr val="FF0000"/>
+                          </a:solidFill>
                           <a:effectLst/>
                         </a:rPr>
                         <a:t>C</a:t>
                       </a:r>
                       <a:endParaRPr lang="fr-FR" sz="1800" dirty="0">
+                        <a:solidFill>
+                          <a:srgbClr val="FF0000"/>
+                        </a:solidFill>
                         <a:effectLst/>
                         <a:latin typeface="Calibri" panose="020F0502020204030204" pitchFamily="34" charset="0"/>
                         <a:ea typeface="Calibri" panose="020F0502020204030204" pitchFamily="34" charset="0"/>
@@ -8128,12 +7888,18 @@
                         </a:spcAft>
                       </a:pPr>
                       <a:r>
-                        <a:rPr lang="fr-FR" sz="1800">
+                        <a:rPr lang="fr-FR" sz="1800" dirty="0">
+                          <a:solidFill>
+                            <a:srgbClr val="FF0000"/>
+                          </a:solidFill>
                           <a:effectLst/>
                         </a:rPr>
                         <a:t>C</a:t>
                       </a:r>
-                      <a:endParaRPr lang="fr-FR" sz="1800">
+                      <a:endParaRPr lang="fr-FR" sz="1800" dirty="0">
+                        <a:solidFill>
+                          <a:srgbClr val="FF0000"/>
+                        </a:solidFill>
                         <a:effectLst/>
                         <a:latin typeface="Calibri" panose="020F0502020204030204" pitchFamily="34" charset="0"/>
                         <a:ea typeface="Calibri" panose="020F0502020204030204" pitchFamily="34" charset="0"/>
@@ -8390,12 +8156,33 @@
                         </a:spcAft>
                       </a:pPr>
                       <a:r>
-                        <a:rPr lang="fr-FR" sz="1800">
+                        <a:rPr lang="fr-FR" sz="1800" dirty="0">
+                          <a:solidFill>
+                            <a:srgbClr val="FF0000"/>
+                          </a:solidFill>
                           <a:effectLst/>
                         </a:rPr>
-                        <a:t>C/C++</a:t>
+                        <a:t>C</a:t>
                       </a:r>
-                      <a:endParaRPr lang="fr-FR" sz="1800">
+                      <a:r>
+                        <a:rPr lang="fr-FR" sz="1800" dirty="0">
+                          <a:effectLst/>
+                        </a:rPr>
+                        <a:t>/</a:t>
+                      </a:r>
+                      <a:r>
+                        <a:rPr lang="fr-FR" sz="1800" dirty="0">
+                          <a:solidFill>
+                            <a:srgbClr val="00B050"/>
+                          </a:solidFill>
+                          <a:effectLst/>
+                        </a:rPr>
+                        <a:t>C++</a:t>
+                      </a:r>
+                      <a:endParaRPr lang="fr-FR" sz="1800" dirty="0">
+                        <a:solidFill>
+                          <a:srgbClr val="00B050"/>
+                        </a:solidFill>
                         <a:effectLst/>
                         <a:latin typeface="Calibri" panose="020F0502020204030204" pitchFamily="34" charset="0"/>
                         <a:ea typeface="Calibri" panose="020F0502020204030204" pitchFamily="34" charset="0"/>
@@ -8640,6 +8427,9 @@
                       </a:pPr>
                       <a:r>
                         <a:rPr lang="fr-FR" sz="1800" dirty="0" smtClean="0">
+                          <a:solidFill>
+                            <a:srgbClr val="00B050"/>
+                          </a:solidFill>
                           <a:effectLst/>
                           <a:latin typeface="Calibri" panose="020F0502020204030204" pitchFamily="34" charset="0"/>
                           <a:ea typeface="Calibri" panose="020F0502020204030204" pitchFamily="34" charset="0"/>
@@ -8648,6 +8438,9 @@
                         <a:t>C++</a:t>
                       </a:r>
                       <a:endParaRPr lang="fr-FR" sz="1800" dirty="0">
+                        <a:solidFill>
+                          <a:srgbClr val="00B050"/>
+                        </a:solidFill>
                         <a:effectLst/>
                         <a:latin typeface="Calibri" panose="020F0502020204030204" pitchFamily="34" charset="0"/>
                         <a:ea typeface="Calibri" panose="020F0502020204030204" pitchFamily="34" charset="0"/>
@@ -8916,7 +8709,7 @@
 </p:sld>
 </file>
 
-<file path=ppt/slides/slide6.xml><?xml version="1.0" encoding="utf-8"?>
+<file path=ppt/slides/slide13.xml><?xml version="1.0" encoding="utf-8"?>
 <p:sld xmlns:a="http://schemas.openxmlformats.org/drawingml/2006/main" xmlns:r="http://schemas.openxmlformats.org/officeDocument/2006/relationships" xmlns:p="http://schemas.openxmlformats.org/presentationml/2006/main">
   <p:cSld>
     <p:spTree>
@@ -9426,7 +9219,1024 @@
 </p:sld>
 </file>
 
+<file path=ppt/slides/slide14.xml><?xml version="1.0" encoding="utf-8"?>
+<p:sld xmlns:a="http://schemas.openxmlformats.org/drawingml/2006/main" xmlns:r="http://schemas.openxmlformats.org/officeDocument/2006/relationships" xmlns:p="http://schemas.openxmlformats.org/presentationml/2006/main">
+  <p:cSld>
+    <p:spTree>
+      <p:nvGrpSpPr>
+        <p:cNvPr id="1" name=""/>
+        <p:cNvGrpSpPr/>
+        <p:nvPr/>
+      </p:nvGrpSpPr>
+      <p:grpSpPr>
+        <a:xfrm>
+          <a:off x="0" y="0"/>
+          <a:ext cx="0" cy="0"/>
+          <a:chOff x="0" y="0"/>
+          <a:chExt cx="0" cy="0"/>
+        </a:xfrm>
+      </p:grpSpPr>
+      <p:sp>
+        <p:nvSpPr>
+          <p:cNvPr id="4" name="Titre 3"/>
+          <p:cNvSpPr>
+            <a:spLocks noGrp="1"/>
+          </p:cNvSpPr>
+          <p:nvPr>
+            <p:ph type="ctrTitle"/>
+          </p:nvPr>
+        </p:nvSpPr>
+        <p:spPr/>
+        <p:txBody>
+          <a:bodyPr/>
+          <a:lstStyle/>
+          <a:p>
+            <a:r>
+              <a:rPr lang="fr-FR" dirty="0" err="1" smtClean="0"/>
+              <a:t>What’s</a:t>
+            </a:r>
+            <a:r>
+              <a:rPr lang="fr-FR" dirty="0" smtClean="0"/>
+              <a:t> </a:t>
+            </a:r>
+            <a:r>
+              <a:rPr lang="fr-FR" dirty="0" err="1" smtClean="0"/>
+              <a:t>next</a:t>
+            </a:r>
+            <a:r>
+              <a:rPr lang="fr-FR" dirty="0" smtClean="0"/>
+              <a:t> ?</a:t>
+            </a:r>
+            <a:endParaRPr lang="fr-FR" dirty="0"/>
+          </a:p>
+        </p:txBody>
+      </p:sp>
+    </p:spTree>
+    <p:extLst>
+      <p:ext uri="{BB962C8B-B14F-4D97-AF65-F5344CB8AC3E}">
+        <p14:creationId xmlns:p14="http://schemas.microsoft.com/office/powerpoint/2010/main" val="3164336437"/>
+      </p:ext>
+    </p:extLst>
+  </p:cSld>
+  <p:clrMapOvr>
+    <a:masterClrMapping/>
+  </p:clrMapOvr>
+  <mc:AlternateContent xmlns:mc="http://schemas.openxmlformats.org/markup-compatibility/2006">
+    <mc:Choice xmlns:p14="http://schemas.microsoft.com/office/powerpoint/2010/main" Requires="p14">
+      <p:transition spd="med" p14:dur="700">
+        <p:fade/>
+      </p:transition>
+    </mc:Choice>
+    <mc:Fallback>
+      <p:transition spd="med">
+        <p:fade/>
+      </p:transition>
+    </mc:Fallback>
+  </mc:AlternateContent>
+</p:sld>
+</file>
+
+<file path=ppt/slides/slide15.xml><?xml version="1.0" encoding="utf-8"?>
+<p:sld xmlns:a="http://schemas.openxmlformats.org/drawingml/2006/main" xmlns:r="http://schemas.openxmlformats.org/officeDocument/2006/relationships" xmlns:p="http://schemas.openxmlformats.org/presentationml/2006/main">
+  <p:cSld>
+    <p:spTree>
+      <p:nvGrpSpPr>
+        <p:cNvPr id="1" name=""/>
+        <p:cNvGrpSpPr/>
+        <p:nvPr/>
+      </p:nvGrpSpPr>
+      <p:grpSpPr>
+        <a:xfrm>
+          <a:off x="0" y="0"/>
+          <a:ext cx="0" cy="0"/>
+          <a:chOff x="0" y="0"/>
+          <a:chExt cx="0" cy="0"/>
+        </a:xfrm>
+      </p:grpSpPr>
+      <p:sp>
+        <p:nvSpPr>
+          <p:cNvPr id="2" name="Titre 1"/>
+          <p:cNvSpPr>
+            <a:spLocks noGrp="1"/>
+          </p:cNvSpPr>
+          <p:nvPr>
+            <p:ph type="title"/>
+          </p:nvPr>
+        </p:nvSpPr>
+        <p:spPr/>
+        <p:txBody>
+          <a:bodyPr/>
+          <a:lstStyle/>
+          <a:p>
+            <a:pPr algn="ctr"/>
+            <a:r>
+              <a:rPr lang="fr-FR" dirty="0" err="1" smtClean="0"/>
+              <a:t>What’s</a:t>
+            </a:r>
+            <a:r>
+              <a:rPr lang="fr-FR" dirty="0" smtClean="0"/>
+              <a:t> </a:t>
+            </a:r>
+            <a:r>
+              <a:rPr lang="fr-FR" dirty="0" err="1" smtClean="0"/>
+              <a:t>next</a:t>
+            </a:r>
+            <a:endParaRPr lang="fr-FR" dirty="0"/>
+          </a:p>
+        </p:txBody>
+      </p:sp>
+      <p:sp>
+        <p:nvSpPr>
+          <p:cNvPr id="3" name="Espace réservé du texte 2"/>
+          <p:cNvSpPr>
+            <a:spLocks noGrp="1"/>
+          </p:cNvSpPr>
+          <p:nvPr>
+            <p:ph type="body" sz="quarter" idx="10"/>
+          </p:nvPr>
+        </p:nvSpPr>
+        <p:spPr/>
+        <p:txBody>
+          <a:bodyPr/>
+          <a:lstStyle/>
+          <a:p>
+            <a:r>
+              <a:rPr lang="fr-FR" dirty="0" smtClean="0"/>
+              <a:t>Communication </a:t>
+            </a:r>
+            <a:r>
+              <a:rPr lang="fr-FR" dirty="0" err="1" smtClean="0"/>
+              <a:t>with</a:t>
+            </a:r>
+            <a:r>
+              <a:rPr lang="fr-FR" dirty="0" smtClean="0"/>
+              <a:t> the </a:t>
+            </a:r>
+            <a:r>
+              <a:rPr lang="fr-FR" dirty="0" err="1" smtClean="0"/>
+              <a:t>wheelchair</a:t>
+            </a:r>
+            <a:endParaRPr lang="fr-FR" dirty="0" smtClean="0"/>
+          </a:p>
+          <a:p>
+            <a:r>
+              <a:rPr lang="fr-FR" dirty="0" smtClean="0"/>
+              <a:t>Communication </a:t>
+            </a:r>
+            <a:r>
+              <a:rPr lang="fr-FR" dirty="0" err="1" smtClean="0"/>
+              <a:t>with</a:t>
+            </a:r>
+            <a:r>
+              <a:rPr lang="fr-FR" dirty="0" smtClean="0"/>
+              <a:t> </a:t>
+            </a:r>
+            <a:r>
+              <a:rPr lang="fr-FR" dirty="0" err="1" smtClean="0"/>
+              <a:t>Fibaro</a:t>
+            </a:r>
+            <a:endParaRPr lang="fr-FR" dirty="0" smtClean="0"/>
+          </a:p>
+          <a:p>
+            <a:endParaRPr lang="fr-FR" dirty="0"/>
+          </a:p>
+        </p:txBody>
+      </p:sp>
+    </p:spTree>
+    <p:extLst>
+      <p:ext uri="{BB962C8B-B14F-4D97-AF65-F5344CB8AC3E}">
+        <p14:creationId xmlns:p14="http://schemas.microsoft.com/office/powerpoint/2010/main" val="1644440659"/>
+      </p:ext>
+    </p:extLst>
+  </p:cSld>
+  <p:clrMapOvr>
+    <a:masterClrMapping/>
+  </p:clrMapOvr>
+  <mc:AlternateContent xmlns:mc="http://schemas.openxmlformats.org/markup-compatibility/2006">
+    <mc:Choice xmlns:p14="http://schemas.microsoft.com/office/powerpoint/2010/main" Requires="p14">
+      <p:transition spd="med" p14:dur="700">
+        <p:fade/>
+      </p:transition>
+    </mc:Choice>
+    <mc:Fallback>
+      <p:transition spd="med">
+        <p:fade/>
+      </p:transition>
+    </mc:Fallback>
+  </mc:AlternateContent>
+</p:sld>
+</file>
+
+<file path=ppt/slides/slide16.xml><?xml version="1.0" encoding="utf-8"?>
+<p:sld xmlns:a="http://schemas.openxmlformats.org/drawingml/2006/main" xmlns:r="http://schemas.openxmlformats.org/officeDocument/2006/relationships" xmlns:p="http://schemas.openxmlformats.org/presentationml/2006/main">
+  <p:cSld>
+    <p:spTree>
+      <p:nvGrpSpPr>
+        <p:cNvPr id="1" name=""/>
+        <p:cNvGrpSpPr/>
+        <p:nvPr/>
+      </p:nvGrpSpPr>
+      <p:grpSpPr>
+        <a:xfrm>
+          <a:off x="0" y="0"/>
+          <a:ext cx="0" cy="0"/>
+          <a:chOff x="0" y="0"/>
+          <a:chExt cx="0" cy="0"/>
+        </a:xfrm>
+      </p:grpSpPr>
+      <p:sp>
+        <p:nvSpPr>
+          <p:cNvPr id="2" name="Titre 1"/>
+          <p:cNvSpPr>
+            <a:spLocks noGrp="1"/>
+          </p:cNvSpPr>
+          <p:nvPr>
+            <p:ph type="title"/>
+          </p:nvPr>
+        </p:nvSpPr>
+        <p:spPr/>
+        <p:txBody>
+          <a:bodyPr/>
+          <a:lstStyle/>
+          <a:p>
+            <a:pPr algn="ctr"/>
+            <a:r>
+              <a:rPr lang="fr-FR" dirty="0" err="1" smtClean="0"/>
+              <a:t>what’s</a:t>
+            </a:r>
+            <a:r>
+              <a:rPr lang="fr-FR" dirty="0" smtClean="0"/>
+              <a:t> </a:t>
+            </a:r>
+            <a:r>
+              <a:rPr lang="fr-FR" dirty="0" err="1" smtClean="0"/>
+              <a:t>next</a:t>
+            </a:r>
+            <a:r>
+              <a:rPr lang="fr-FR" dirty="0" smtClean="0"/>
+              <a:t> ?</a:t>
+            </a:r>
+            <a:endParaRPr lang="fr-FR" dirty="0"/>
+          </a:p>
+        </p:txBody>
+      </p:sp>
+      <p:sp>
+        <p:nvSpPr>
+          <p:cNvPr id="3" name="Espace réservé du texte 2"/>
+          <p:cNvSpPr>
+            <a:spLocks noGrp="1"/>
+          </p:cNvSpPr>
+          <p:nvPr>
+            <p:ph type="body" sz="quarter" idx="10"/>
+          </p:nvPr>
+        </p:nvSpPr>
+        <p:spPr/>
+        <p:txBody>
+          <a:bodyPr/>
+          <a:lstStyle/>
+          <a:p>
+            <a:r>
+              <a:rPr lang="fr-FR" dirty="0" smtClean="0"/>
+              <a:t>C++</a:t>
+            </a:r>
+          </a:p>
+          <a:p>
+            <a:r>
+              <a:rPr lang="fr-FR" dirty="0" smtClean="0"/>
+              <a:t>C#</a:t>
+            </a:r>
+          </a:p>
+          <a:p>
+            <a:r>
+              <a:rPr lang="fr-FR" dirty="0" smtClean="0"/>
+              <a:t>master </a:t>
+            </a:r>
+            <a:r>
+              <a:rPr lang="fr-FR" dirty="0" err="1" smtClean="0"/>
+              <a:t>versioning</a:t>
+            </a:r>
+            <a:endParaRPr lang="fr-FR" dirty="0" smtClean="0"/>
+          </a:p>
+        </p:txBody>
+      </p:sp>
+    </p:spTree>
+    <p:extLst>
+      <p:ext uri="{BB962C8B-B14F-4D97-AF65-F5344CB8AC3E}">
+        <p14:creationId xmlns:p14="http://schemas.microsoft.com/office/powerpoint/2010/main" val="2169738315"/>
+      </p:ext>
+    </p:extLst>
+  </p:cSld>
+  <p:clrMapOvr>
+    <a:masterClrMapping/>
+  </p:clrMapOvr>
+  <mc:AlternateContent xmlns:mc="http://schemas.openxmlformats.org/markup-compatibility/2006">
+    <mc:Choice xmlns:p14="http://schemas.microsoft.com/office/powerpoint/2010/main" Requires="p14">
+      <p:transition spd="med" p14:dur="700">
+        <p:fade/>
+      </p:transition>
+    </mc:Choice>
+    <mc:Fallback>
+      <p:transition spd="med">
+        <p:fade/>
+      </p:transition>
+    </mc:Fallback>
+  </mc:AlternateContent>
+</p:sld>
+</file>
+
+<file path=ppt/slides/slide2.xml><?xml version="1.0" encoding="utf-8"?>
+<p:sld xmlns:a="http://schemas.openxmlformats.org/drawingml/2006/main" xmlns:r="http://schemas.openxmlformats.org/officeDocument/2006/relationships" xmlns:p="http://schemas.openxmlformats.org/presentationml/2006/main">
+  <p:cSld>
+    <p:spTree>
+      <p:nvGrpSpPr>
+        <p:cNvPr id="1" name=""/>
+        <p:cNvGrpSpPr/>
+        <p:nvPr/>
+      </p:nvGrpSpPr>
+      <p:grpSpPr>
+        <a:xfrm>
+          <a:off x="0" y="0"/>
+          <a:ext cx="0" cy="0"/>
+          <a:chOff x="0" y="0"/>
+          <a:chExt cx="0" cy="0"/>
+        </a:xfrm>
+      </p:grpSpPr>
+      <p:sp>
+        <p:nvSpPr>
+          <p:cNvPr id="2" name="Titre 1"/>
+          <p:cNvSpPr>
+            <a:spLocks noGrp="1"/>
+          </p:cNvSpPr>
+          <p:nvPr>
+            <p:ph type="title"/>
+          </p:nvPr>
+        </p:nvSpPr>
+        <p:spPr/>
+        <p:txBody>
+          <a:bodyPr/>
+          <a:lstStyle/>
+          <a:p>
+            <a:pPr algn="ctr"/>
+            <a:r>
+              <a:rPr lang="fr-FR" dirty="0" smtClean="0"/>
+              <a:t>Contents</a:t>
+            </a:r>
+            <a:endParaRPr lang="fr-FR" dirty="0"/>
+          </a:p>
+        </p:txBody>
+      </p:sp>
+      <p:sp>
+        <p:nvSpPr>
+          <p:cNvPr id="3" name="Espace réservé du contenu 2"/>
+          <p:cNvSpPr>
+            <a:spLocks noGrp="1"/>
+          </p:cNvSpPr>
+          <p:nvPr>
+            <p:ph idx="4294967295"/>
+          </p:nvPr>
+        </p:nvSpPr>
+        <p:spPr>
+          <a:xfrm>
+            <a:off x="628650" y="1369219"/>
+            <a:ext cx="7886700" cy="3263504"/>
+          </a:xfrm>
+          <a:prstGeom prst="rect">
+            <a:avLst/>
+          </a:prstGeom>
+        </p:spPr>
+        <p:txBody>
+          <a:bodyPr/>
+          <a:lstStyle/>
+          <a:p>
+            <a:endParaRPr lang="fr-FR" dirty="0" smtClean="0"/>
+          </a:p>
+          <a:p>
+            <a:pPr marL="0" indent="0">
+              <a:buNone/>
+            </a:pPr>
+            <a:r>
+              <a:rPr lang="fr-FR" dirty="0" smtClean="0"/>
+              <a:t>• </a:t>
+            </a:r>
+            <a:r>
+              <a:rPr lang="fr-FR" dirty="0" err="1" smtClean="0"/>
+              <a:t>Context</a:t>
+            </a:r>
+            <a:endParaRPr lang="fr-FR" dirty="0" smtClean="0"/>
+          </a:p>
+          <a:p>
+            <a:pPr marL="0" indent="0">
+              <a:buNone/>
+            </a:pPr>
+            <a:r>
+              <a:rPr lang="fr-FR" dirty="0" smtClean="0"/>
+              <a:t>• </a:t>
+            </a:r>
+            <a:r>
+              <a:rPr lang="fr-FR" dirty="0" err="1" smtClean="0"/>
+              <a:t>Pre-study</a:t>
+            </a:r>
+            <a:endParaRPr lang="fr-FR" dirty="0" smtClean="0"/>
+          </a:p>
+          <a:p>
+            <a:pPr marL="0" indent="0">
+              <a:buNone/>
+            </a:pPr>
+            <a:r>
+              <a:rPr lang="fr-FR" dirty="0" smtClean="0"/>
+              <a:t>• </a:t>
+            </a:r>
+            <a:r>
+              <a:rPr lang="fr-FR" dirty="0" err="1" smtClean="0"/>
+              <a:t>Specifications</a:t>
+            </a:r>
+            <a:endParaRPr lang="fr-FR" dirty="0" smtClean="0"/>
+          </a:p>
+        </p:txBody>
+      </p:sp>
+    </p:spTree>
+    <p:extLst>
+      <p:ext uri="{BB962C8B-B14F-4D97-AF65-F5344CB8AC3E}">
+        <p14:creationId xmlns:p14="http://schemas.microsoft.com/office/powerpoint/2010/main" val="3396826098"/>
+      </p:ext>
+    </p:extLst>
+  </p:cSld>
+  <p:clrMapOvr>
+    <a:masterClrMapping/>
+  </p:clrMapOvr>
+  <mc:AlternateContent xmlns:mc="http://schemas.openxmlformats.org/markup-compatibility/2006" xmlns:p14="http://schemas.microsoft.com/office/powerpoint/2010/main">
+    <mc:Choice Requires="p14">
+      <p:transition spd="med" p14:dur="700">
+        <p:fade/>
+      </p:transition>
+    </mc:Choice>
+    <mc:Fallback xmlns="">
+      <p:transition spd="med">
+        <p:fade/>
+      </p:transition>
+    </mc:Fallback>
+  </mc:AlternateContent>
+</p:sld>
+</file>
+
+<file path=ppt/slides/slide3.xml><?xml version="1.0" encoding="utf-8"?>
+<p:sld xmlns:a="http://schemas.openxmlformats.org/drawingml/2006/main" xmlns:r="http://schemas.openxmlformats.org/officeDocument/2006/relationships" xmlns:p="http://schemas.openxmlformats.org/presentationml/2006/main">
+  <p:cSld>
+    <p:spTree>
+      <p:nvGrpSpPr>
+        <p:cNvPr id="1" name=""/>
+        <p:cNvGrpSpPr/>
+        <p:nvPr/>
+      </p:nvGrpSpPr>
+      <p:grpSpPr>
+        <a:xfrm>
+          <a:off x="0" y="0"/>
+          <a:ext cx="0" cy="0"/>
+          <a:chOff x="0" y="0"/>
+          <a:chExt cx="0" cy="0"/>
+        </a:xfrm>
+      </p:grpSpPr>
+      <p:sp>
+        <p:nvSpPr>
+          <p:cNvPr id="2" name="Titre 1"/>
+          <p:cNvSpPr>
+            <a:spLocks noGrp="1"/>
+          </p:cNvSpPr>
+          <p:nvPr>
+            <p:ph type="ctrTitle"/>
+          </p:nvPr>
+        </p:nvSpPr>
+        <p:spPr/>
+        <p:txBody>
+          <a:bodyPr/>
+          <a:lstStyle/>
+          <a:p>
+            <a:pPr algn="ctr"/>
+            <a:r>
+              <a:rPr lang="fr-FR" dirty="0" err="1" smtClean="0"/>
+              <a:t>Context</a:t>
+            </a:r>
+            <a:endParaRPr lang="fr-FR" dirty="0"/>
+          </a:p>
+        </p:txBody>
+      </p:sp>
+    </p:spTree>
+    <p:extLst>
+      <p:ext uri="{BB962C8B-B14F-4D97-AF65-F5344CB8AC3E}">
+        <p14:creationId xmlns:p14="http://schemas.microsoft.com/office/powerpoint/2010/main" val="3570722297"/>
+      </p:ext>
+    </p:extLst>
+  </p:cSld>
+  <p:clrMapOvr>
+    <a:masterClrMapping/>
+  </p:clrMapOvr>
+  <mc:AlternateContent xmlns:mc="http://schemas.openxmlformats.org/markup-compatibility/2006" xmlns:p14="http://schemas.microsoft.com/office/powerpoint/2010/main">
+    <mc:Choice Requires="p14">
+      <p:transition spd="med" p14:dur="700">
+        <p:fade/>
+      </p:transition>
+    </mc:Choice>
+    <mc:Fallback xmlns="">
+      <p:transition spd="med">
+        <p:fade/>
+      </p:transition>
+    </mc:Fallback>
+  </mc:AlternateContent>
+</p:sld>
+</file>
+
+<file path=ppt/slides/slide4.xml><?xml version="1.0" encoding="utf-8"?>
+<p:sld xmlns:a="http://schemas.openxmlformats.org/drawingml/2006/main" xmlns:r="http://schemas.openxmlformats.org/officeDocument/2006/relationships" xmlns:p="http://schemas.openxmlformats.org/presentationml/2006/main">
+  <p:cSld>
+    <p:spTree>
+      <p:nvGrpSpPr>
+        <p:cNvPr id="1" name=""/>
+        <p:cNvGrpSpPr/>
+        <p:nvPr/>
+      </p:nvGrpSpPr>
+      <p:grpSpPr>
+        <a:xfrm>
+          <a:off x="0" y="0"/>
+          <a:ext cx="0" cy="0"/>
+          <a:chOff x="0" y="0"/>
+          <a:chExt cx="0" cy="0"/>
+        </a:xfrm>
+      </p:grpSpPr>
+      <p:sp>
+        <p:nvSpPr>
+          <p:cNvPr id="2" name="Titre 1"/>
+          <p:cNvSpPr>
+            <a:spLocks noGrp="1"/>
+          </p:cNvSpPr>
+          <p:nvPr>
+            <p:ph type="title"/>
+          </p:nvPr>
+        </p:nvSpPr>
+        <p:spPr/>
+        <p:txBody>
+          <a:bodyPr/>
+          <a:lstStyle/>
+          <a:p>
+            <a:pPr algn="ctr"/>
+            <a:r>
+              <a:rPr lang="fr-FR" dirty="0" err="1" smtClean="0"/>
+              <a:t>Context</a:t>
+            </a:r>
+            <a:endParaRPr lang="fr-FR" dirty="0"/>
+          </a:p>
+        </p:txBody>
+      </p:sp>
+      <p:sp>
+        <p:nvSpPr>
+          <p:cNvPr id="3" name="Espace réservé du texte 2"/>
+          <p:cNvSpPr>
+            <a:spLocks noGrp="1"/>
+          </p:cNvSpPr>
+          <p:nvPr>
+            <p:ph type="body" sz="quarter" idx="10"/>
+          </p:nvPr>
+        </p:nvSpPr>
+        <p:spPr/>
+        <p:txBody>
+          <a:bodyPr/>
+          <a:lstStyle/>
+          <a:p>
+            <a:r>
+              <a:rPr lang="fr-FR" dirty="0" err="1" smtClean="0"/>
+              <a:t>Ergovie</a:t>
+            </a:r>
+            <a:r>
+              <a:rPr lang="fr-FR" dirty="0" smtClean="0"/>
+              <a:t> </a:t>
+            </a:r>
+            <a:r>
+              <a:rPr lang="fr-FR" dirty="0" err="1"/>
+              <a:t>is</a:t>
+            </a:r>
+            <a:r>
+              <a:rPr lang="fr-FR" dirty="0"/>
+              <a:t> a Breton society </a:t>
+            </a:r>
+            <a:r>
+              <a:rPr lang="fr-FR" dirty="0" err="1"/>
+              <a:t>who</a:t>
+            </a:r>
+            <a:r>
+              <a:rPr lang="fr-FR" dirty="0"/>
+              <a:t> </a:t>
+            </a:r>
+            <a:r>
+              <a:rPr lang="fr-FR" dirty="0" err="1"/>
+              <a:t>sells</a:t>
+            </a:r>
+            <a:r>
+              <a:rPr lang="fr-FR" dirty="0"/>
+              <a:t> and </a:t>
+            </a:r>
+            <a:r>
+              <a:rPr lang="fr-FR" dirty="0" err="1"/>
+              <a:t>repairs</a:t>
+            </a:r>
+            <a:r>
+              <a:rPr lang="fr-FR" dirty="0"/>
+              <a:t> </a:t>
+            </a:r>
+            <a:r>
+              <a:rPr lang="fr-FR" dirty="0" err="1"/>
+              <a:t>wheelchairs</a:t>
+            </a:r>
+            <a:r>
+              <a:rPr lang="fr-FR" dirty="0"/>
+              <a:t>. </a:t>
+            </a:r>
+            <a:r>
+              <a:rPr lang="fr-FR" dirty="0" err="1"/>
+              <a:t>They</a:t>
+            </a:r>
+            <a:r>
+              <a:rPr lang="fr-FR" dirty="0"/>
+              <a:t> </a:t>
+            </a:r>
+            <a:r>
+              <a:rPr lang="fr-FR" dirty="0" err="1"/>
+              <a:t>recently</a:t>
+            </a:r>
+            <a:r>
+              <a:rPr lang="fr-FR" dirty="0"/>
+              <a:t> </a:t>
+            </a:r>
+            <a:r>
+              <a:rPr lang="fr-FR" dirty="0" err="1"/>
+              <a:t>begin</a:t>
+            </a:r>
+            <a:r>
+              <a:rPr lang="fr-FR" dirty="0"/>
+              <a:t> to </a:t>
+            </a:r>
+            <a:r>
+              <a:rPr lang="fr-FR" dirty="0" err="1"/>
+              <a:t>develop</a:t>
+            </a:r>
+            <a:r>
+              <a:rPr lang="fr-FR" dirty="0"/>
+              <a:t> </a:t>
+            </a:r>
+            <a:r>
+              <a:rPr lang="fr-FR" dirty="0" err="1"/>
+              <a:t>domotic</a:t>
+            </a:r>
+            <a:r>
+              <a:rPr lang="fr-FR" dirty="0"/>
+              <a:t> solutions.</a:t>
+            </a:r>
+            <a:endParaRPr lang="fr-FR" dirty="0"/>
+          </a:p>
+        </p:txBody>
+      </p:sp>
+    </p:spTree>
+    <p:extLst>
+      <p:ext uri="{BB962C8B-B14F-4D97-AF65-F5344CB8AC3E}">
+        <p14:creationId xmlns:p14="http://schemas.microsoft.com/office/powerpoint/2010/main" val="3696323016"/>
+      </p:ext>
+    </p:extLst>
+  </p:cSld>
+  <p:clrMapOvr>
+    <a:masterClrMapping/>
+  </p:clrMapOvr>
+  <mc:AlternateContent xmlns:mc="http://schemas.openxmlformats.org/markup-compatibility/2006">
+    <mc:Choice xmlns:p14="http://schemas.microsoft.com/office/powerpoint/2010/main" Requires="p14">
+      <p:transition spd="med" p14:dur="700">
+        <p:fade/>
+      </p:transition>
+    </mc:Choice>
+    <mc:Fallback>
+      <p:transition spd="med">
+        <p:fade/>
+      </p:transition>
+    </mc:Fallback>
+  </mc:AlternateContent>
+</p:sld>
+</file>
+
+<file path=ppt/slides/slide5.xml><?xml version="1.0" encoding="utf-8"?>
+<p:sld xmlns:a="http://schemas.openxmlformats.org/drawingml/2006/main" xmlns:r="http://schemas.openxmlformats.org/officeDocument/2006/relationships" xmlns:p="http://schemas.openxmlformats.org/presentationml/2006/main">
+  <p:cSld>
+    <p:spTree>
+      <p:nvGrpSpPr>
+        <p:cNvPr id="1" name=""/>
+        <p:cNvGrpSpPr/>
+        <p:nvPr/>
+      </p:nvGrpSpPr>
+      <p:grpSpPr>
+        <a:xfrm>
+          <a:off x="0" y="0"/>
+          <a:ext cx="0" cy="0"/>
+          <a:chOff x="0" y="0"/>
+          <a:chExt cx="0" cy="0"/>
+        </a:xfrm>
+      </p:grpSpPr>
+      <p:sp>
+        <p:nvSpPr>
+          <p:cNvPr id="3" name="Espace réservé du texte 2"/>
+          <p:cNvSpPr>
+            <a:spLocks noGrp="1"/>
+          </p:cNvSpPr>
+          <p:nvPr>
+            <p:ph type="body" sz="quarter" idx="10"/>
+          </p:nvPr>
+        </p:nvSpPr>
+        <p:spPr>
+          <a:xfrm>
+            <a:off x="1606887" y="1073098"/>
+            <a:ext cx="5930226" cy="3521525"/>
+          </a:xfrm>
+        </p:spPr>
+        <p:txBody>
+          <a:bodyPr/>
+          <a:lstStyle/>
+          <a:p>
+            <a:r>
+              <a:rPr lang="fr-FR" dirty="0" err="1"/>
+              <a:t>Need</a:t>
+            </a:r>
+            <a:r>
+              <a:rPr lang="fr-FR" dirty="0"/>
+              <a:t> of a simple interface for </a:t>
+            </a:r>
+            <a:r>
+              <a:rPr lang="fr-FR" dirty="0" err="1"/>
+              <a:t>disabled</a:t>
+            </a:r>
+            <a:r>
+              <a:rPr lang="fr-FR" dirty="0"/>
+              <a:t> people</a:t>
+            </a:r>
+          </a:p>
+          <a:p>
+            <a:r>
+              <a:rPr lang="fr-FR" dirty="0" err="1"/>
+              <a:t>Existing</a:t>
+            </a:r>
+            <a:r>
+              <a:rPr lang="fr-FR" dirty="0"/>
+              <a:t> solutions but </a:t>
+            </a:r>
+            <a:r>
+              <a:rPr lang="fr-FR" dirty="0" err="1"/>
+              <a:t>too</a:t>
+            </a:r>
+            <a:r>
+              <a:rPr lang="fr-FR" dirty="0"/>
+              <a:t> </a:t>
+            </a:r>
+            <a:r>
+              <a:rPr lang="fr-FR" dirty="0" err="1"/>
+              <a:t>complex</a:t>
+            </a:r>
+            <a:r>
+              <a:rPr lang="fr-FR" dirty="0"/>
+              <a:t> and </a:t>
+            </a:r>
+            <a:r>
+              <a:rPr lang="fr-FR" dirty="0" err="1"/>
+              <a:t>inadapted</a:t>
+            </a:r>
+            <a:endParaRPr lang="fr-FR" dirty="0"/>
+          </a:p>
+          <a:p>
+            <a:endParaRPr lang="fr-FR" dirty="0"/>
+          </a:p>
+        </p:txBody>
+      </p:sp>
+      <p:sp>
+        <p:nvSpPr>
+          <p:cNvPr id="4" name="Titre 3"/>
+          <p:cNvSpPr>
+            <a:spLocks noGrp="1"/>
+          </p:cNvSpPr>
+          <p:nvPr>
+            <p:ph type="title"/>
+          </p:nvPr>
+        </p:nvSpPr>
+        <p:spPr>
+          <a:xfrm>
+            <a:off x="1497310" y="80948"/>
+            <a:ext cx="6149380" cy="857250"/>
+          </a:xfrm>
+        </p:spPr>
+        <p:txBody>
+          <a:bodyPr/>
+          <a:lstStyle/>
+          <a:p>
+            <a:pPr algn="ctr"/>
+            <a:r>
+              <a:rPr lang="fr-FR" dirty="0" err="1" smtClean="0"/>
+              <a:t>context</a:t>
+            </a:r>
+            <a:endParaRPr lang="fr-FR" dirty="0"/>
+          </a:p>
+        </p:txBody>
+      </p:sp>
+    </p:spTree>
+    <p:extLst>
+      <p:ext uri="{BB962C8B-B14F-4D97-AF65-F5344CB8AC3E}">
+        <p14:creationId xmlns:p14="http://schemas.microsoft.com/office/powerpoint/2010/main" val="2526572623"/>
+      </p:ext>
+    </p:extLst>
+  </p:cSld>
+  <p:clrMapOvr>
+    <a:masterClrMapping/>
+  </p:clrMapOvr>
+  <mc:AlternateContent xmlns:mc="http://schemas.openxmlformats.org/markup-compatibility/2006">
+    <mc:Choice xmlns:p14="http://schemas.microsoft.com/office/powerpoint/2010/main" Requires="p14">
+      <p:transition spd="med" p14:dur="700">
+        <p:fade/>
+      </p:transition>
+    </mc:Choice>
+    <mc:Fallback>
+      <p:transition spd="med">
+        <p:fade/>
+      </p:transition>
+    </mc:Fallback>
+  </mc:AlternateContent>
+</p:sld>
+</file>
+
+<file path=ppt/slides/slide6.xml><?xml version="1.0" encoding="utf-8"?>
+<p:sld xmlns:a="http://schemas.openxmlformats.org/drawingml/2006/main" xmlns:r="http://schemas.openxmlformats.org/officeDocument/2006/relationships" xmlns:p="http://schemas.openxmlformats.org/presentationml/2006/main">
+  <p:cSld>
+    <p:spTree>
+      <p:nvGrpSpPr>
+        <p:cNvPr id="1" name=""/>
+        <p:cNvGrpSpPr/>
+        <p:nvPr/>
+      </p:nvGrpSpPr>
+      <p:grpSpPr>
+        <a:xfrm>
+          <a:off x="0" y="0"/>
+          <a:ext cx="0" cy="0"/>
+          <a:chOff x="0" y="0"/>
+          <a:chExt cx="0" cy="0"/>
+        </a:xfrm>
+      </p:grpSpPr>
+      <p:sp>
+        <p:nvSpPr>
+          <p:cNvPr id="2" name="Titre 1"/>
+          <p:cNvSpPr>
+            <a:spLocks noGrp="1"/>
+          </p:cNvSpPr>
+          <p:nvPr>
+            <p:ph type="title"/>
+          </p:nvPr>
+        </p:nvSpPr>
+        <p:spPr/>
+        <p:txBody>
+          <a:bodyPr/>
+          <a:lstStyle/>
+          <a:p>
+            <a:pPr algn="ctr"/>
+            <a:r>
+              <a:rPr lang="fr-FR" dirty="0" err="1" smtClean="0"/>
+              <a:t>context</a:t>
+            </a:r>
+            <a:endParaRPr lang="fr-FR" dirty="0"/>
+          </a:p>
+        </p:txBody>
+      </p:sp>
+      <p:sp>
+        <p:nvSpPr>
+          <p:cNvPr id="3" name="Espace réservé du texte 2"/>
+          <p:cNvSpPr>
+            <a:spLocks noGrp="1"/>
+          </p:cNvSpPr>
+          <p:nvPr>
+            <p:ph type="body" sz="quarter" idx="10"/>
+          </p:nvPr>
+        </p:nvSpPr>
+        <p:spPr/>
+        <p:txBody>
+          <a:bodyPr/>
+          <a:lstStyle/>
+          <a:p>
+            <a:r>
+              <a:rPr lang="fr-FR" dirty="0" err="1" smtClean="0"/>
+              <a:t>What</a:t>
+            </a:r>
+            <a:r>
+              <a:rPr lang="fr-FR" dirty="0" smtClean="0"/>
+              <a:t> has been </a:t>
+            </a:r>
+            <a:r>
+              <a:rPr lang="fr-FR" dirty="0" err="1" smtClean="0"/>
+              <a:t>done</a:t>
+            </a:r>
+            <a:r>
+              <a:rPr lang="fr-FR" dirty="0" smtClean="0"/>
+              <a:t> by the </a:t>
+            </a:r>
+            <a:r>
+              <a:rPr lang="fr-FR" dirty="0" err="1" smtClean="0"/>
+              <a:t>previous</a:t>
+            </a:r>
+            <a:r>
+              <a:rPr lang="fr-FR" dirty="0" smtClean="0"/>
+              <a:t> team</a:t>
+            </a:r>
+            <a:endParaRPr lang="fr-FR" dirty="0"/>
+          </a:p>
+        </p:txBody>
+      </p:sp>
+    </p:spTree>
+    <p:extLst>
+      <p:ext uri="{BB962C8B-B14F-4D97-AF65-F5344CB8AC3E}">
+        <p14:creationId xmlns:p14="http://schemas.microsoft.com/office/powerpoint/2010/main" val="434014414"/>
+      </p:ext>
+    </p:extLst>
+  </p:cSld>
+  <p:clrMapOvr>
+    <a:masterClrMapping/>
+  </p:clrMapOvr>
+  <mc:AlternateContent xmlns:mc="http://schemas.openxmlformats.org/markup-compatibility/2006">
+    <mc:Choice xmlns:p14="http://schemas.microsoft.com/office/powerpoint/2010/main" Requires="p14">
+      <p:transition spd="med" p14:dur="700">
+        <p:fade/>
+      </p:transition>
+    </mc:Choice>
+    <mc:Fallback>
+      <p:transition spd="med">
+        <p:fade/>
+      </p:transition>
+    </mc:Fallback>
+  </mc:AlternateContent>
+</p:sld>
+</file>
+
 <file path=ppt/slides/slide7.xml><?xml version="1.0" encoding="utf-8"?>
+<p:sld xmlns:a="http://schemas.openxmlformats.org/drawingml/2006/main" xmlns:r="http://schemas.openxmlformats.org/officeDocument/2006/relationships" xmlns:p="http://schemas.openxmlformats.org/presentationml/2006/main">
+  <p:cSld>
+    <p:spTree>
+      <p:nvGrpSpPr>
+        <p:cNvPr id="1" name=""/>
+        <p:cNvGrpSpPr/>
+        <p:nvPr/>
+      </p:nvGrpSpPr>
+      <p:grpSpPr>
+        <a:xfrm>
+          <a:off x="0" y="0"/>
+          <a:ext cx="0" cy="0"/>
+          <a:chOff x="0" y="0"/>
+          <a:chExt cx="0" cy="0"/>
+        </a:xfrm>
+      </p:grpSpPr>
+      <p:sp>
+        <p:nvSpPr>
+          <p:cNvPr id="4" name="Titre 3"/>
+          <p:cNvSpPr>
+            <a:spLocks noGrp="1"/>
+          </p:cNvSpPr>
+          <p:nvPr>
+            <p:ph type="ctrTitle"/>
+          </p:nvPr>
+        </p:nvSpPr>
+        <p:spPr/>
+        <p:txBody>
+          <a:bodyPr/>
+          <a:lstStyle/>
+          <a:p>
+            <a:r>
+              <a:rPr lang="fr-FR" dirty="0" err="1" smtClean="0"/>
+              <a:t>specifications</a:t>
+            </a:r>
+            <a:endParaRPr lang="fr-FR" dirty="0"/>
+          </a:p>
+        </p:txBody>
+      </p:sp>
+    </p:spTree>
+    <p:extLst>
+      <p:ext uri="{BB962C8B-B14F-4D97-AF65-F5344CB8AC3E}">
+        <p14:creationId xmlns:p14="http://schemas.microsoft.com/office/powerpoint/2010/main" val="624776729"/>
+      </p:ext>
+    </p:extLst>
+  </p:cSld>
+  <p:clrMapOvr>
+    <a:masterClrMapping/>
+  </p:clrMapOvr>
+  <mc:AlternateContent xmlns:mc="http://schemas.openxmlformats.org/markup-compatibility/2006">
+    <mc:Choice xmlns:p14="http://schemas.microsoft.com/office/powerpoint/2010/main" Requires="p14">
+      <p:transition spd="med" p14:dur="700">
+        <p:fade/>
+      </p:transition>
+    </mc:Choice>
+    <mc:Fallback>
+      <p:transition spd="med">
+        <p:fade/>
+      </p:transition>
+    </mc:Fallback>
+  </mc:AlternateContent>
+</p:sld>
+</file>
+
+<file path=ppt/slides/slide8.xml><?xml version="1.0" encoding="utf-8"?>
 <p:sld xmlns:a="http://schemas.openxmlformats.org/drawingml/2006/main" xmlns:r="http://schemas.openxmlformats.org/officeDocument/2006/relationships" xmlns:p="http://schemas.openxmlformats.org/presentationml/2006/main">
   <p:cSld>
     <p:spTree>
@@ -9467,110 +10277,368 @@
           </a:p>
         </p:txBody>
       </p:sp>
-      <p:sp>
-        <p:nvSpPr>
-          <p:cNvPr id="5" name="Espace réservé du contenu 4"/>
-          <p:cNvSpPr>
-            <a:spLocks noGrp="1"/>
-          </p:cNvSpPr>
+      <p:graphicFrame>
+        <p:nvGraphicFramePr>
+          <p:cNvPr id="2" name="Tableau 1"/>
+          <p:cNvGraphicFramePr>
+            <a:graphicFrameLocks noGrp="1"/>
+          </p:cNvGraphicFramePr>
           <p:nvPr>
-            <p:ph idx="4294967295"/>
+            <p:extLst>
+              <p:ext uri="{D42A27DB-BD31-4B8C-83A1-F6EECF244321}">
+                <p14:modId xmlns:p14="http://schemas.microsoft.com/office/powerpoint/2010/main" val="4087735776"/>
+              </p:ext>
+            </p:extLst>
           </p:nvPr>
-        </p:nvSpPr>
-        <p:spPr>
-          <a:xfrm>
-            <a:off x="628650" y="1369219"/>
-            <a:ext cx="7886700" cy="3263504"/>
-          </a:xfrm>
-          <a:prstGeom prst="rect">
-            <a:avLst/>
-          </a:prstGeom>
-        </p:spPr>
-        <p:txBody>
-          <a:bodyPr/>
-          <a:lstStyle/>
-          <a:p>
-            <a:r>
-              <a:rPr lang="fr-FR" dirty="0" err="1" smtClean="0"/>
-              <a:t>Enabling</a:t>
-            </a:r>
-            <a:r>
-              <a:rPr lang="fr-FR" dirty="0" smtClean="0"/>
-              <a:t> people to switch on/off machines</a:t>
-            </a:r>
-          </a:p>
-          <a:p>
-            <a:r>
-              <a:rPr lang="fr-FR" dirty="0" err="1" smtClean="0"/>
-              <a:t>Adapted</a:t>
-            </a:r>
-            <a:r>
-              <a:rPr lang="fr-FR" dirty="0" smtClean="0"/>
-              <a:t> to </a:t>
-            </a:r>
-            <a:r>
-              <a:rPr lang="fr-FR" dirty="0" err="1" smtClean="0"/>
-              <a:t>users</a:t>
-            </a:r>
-            <a:endParaRPr lang="fr-FR" dirty="0" smtClean="0"/>
-          </a:p>
-          <a:p>
-            <a:r>
-              <a:rPr lang="fr-FR" dirty="0" smtClean="0"/>
-              <a:t>A « scrolling » mode (traduction à revoir)</a:t>
-            </a:r>
-          </a:p>
-          <a:p>
-            <a:r>
-              <a:rPr lang="fr-FR" dirty="0" smtClean="0"/>
-              <a:t>Configuration </a:t>
-            </a:r>
-            <a:r>
-              <a:rPr lang="fr-FR" dirty="0" err="1" smtClean="0"/>
-              <a:t>available</a:t>
-            </a:r>
-            <a:r>
-              <a:rPr lang="fr-FR" dirty="0" smtClean="0"/>
-              <a:t>, </a:t>
-            </a:r>
-            <a:r>
-              <a:rPr lang="fr-FR" dirty="0" err="1" smtClean="0"/>
-              <a:t>only</a:t>
-            </a:r>
-            <a:r>
-              <a:rPr lang="fr-FR" dirty="0" smtClean="0"/>
-              <a:t> for </a:t>
-            </a:r>
-            <a:r>
-              <a:rPr lang="fr-FR" dirty="0" err="1" smtClean="0"/>
-              <a:t>technician</a:t>
-            </a:r>
-            <a:endParaRPr lang="fr-FR" dirty="0" smtClean="0"/>
-          </a:p>
-          <a:p>
-            <a:r>
-              <a:rPr lang="fr-FR" dirty="0" smtClean="0"/>
-              <a:t>Feedback </a:t>
-            </a:r>
-            <a:r>
-              <a:rPr lang="fr-FR" dirty="0" err="1" smtClean="0"/>
-              <a:t>from</a:t>
-            </a:r>
-            <a:r>
-              <a:rPr lang="fr-FR" dirty="0" smtClean="0"/>
-              <a:t> the </a:t>
-            </a:r>
-            <a:r>
-              <a:rPr lang="fr-FR" dirty="0" err="1" smtClean="0"/>
-              <a:t>wheelchair</a:t>
-            </a:r>
-            <a:endParaRPr lang="fr-FR" dirty="0" smtClean="0"/>
-          </a:p>
-          <a:p>
-            <a:endParaRPr lang="fr-FR" dirty="0"/>
-          </a:p>
-        </p:txBody>
-      </p:sp>
+        </p:nvGraphicFramePr>
+        <p:xfrm>
+          <a:off x="631983" y="938198"/>
+          <a:ext cx="7337898" cy="2695946"/>
+        </p:xfrm>
+        <a:graphic>
+          <a:graphicData uri="http://schemas.openxmlformats.org/drawingml/2006/table">
+            <a:tbl>
+              <a:tblPr firstRow="1" bandRow="1">
+                <a:tableStyleId>{5C22544A-7EE6-4342-B048-85BDC9FD1C3A}</a:tableStyleId>
+              </a:tblPr>
+              <a:tblGrid>
+                <a:gridCol w="3668949"/>
+                <a:gridCol w="3668949"/>
+              </a:tblGrid>
+              <a:tr h="319410">
+                <a:tc>
+                  <a:txBody>
+                    <a:bodyPr/>
+                    <a:lstStyle/>
+                    <a:p>
+                      <a:pPr algn="ctr"/>
+                      <a:endParaRPr lang="fr-FR" dirty="0"/>
+                    </a:p>
+                  </a:txBody>
+                  <a:tcPr/>
+                </a:tc>
+                <a:tc>
+                  <a:txBody>
+                    <a:bodyPr/>
+                    <a:lstStyle/>
+                    <a:p>
+                      <a:pPr algn="ctr"/>
+                      <a:endParaRPr lang="fr-FR"/>
+                    </a:p>
+                  </a:txBody>
+                  <a:tcPr/>
+                </a:tc>
+              </a:tr>
+              <a:tr h="399262">
+                <a:tc>
+                  <a:txBody>
+                    <a:bodyPr/>
+                    <a:lstStyle/>
+                    <a:p>
+                      <a:pPr marL="0" marR="0" indent="0" algn="ctr" defTabSz="457200" rtl="0" eaLnBrk="1" fontAlgn="auto" latinLnBrk="0" hangingPunct="1">
+                        <a:lnSpc>
+                          <a:spcPct val="100000"/>
+                        </a:lnSpc>
+                        <a:spcBef>
+                          <a:spcPts val="0"/>
+                        </a:spcBef>
+                        <a:spcAft>
+                          <a:spcPts val="0"/>
+                        </a:spcAft>
+                        <a:buClrTx/>
+                        <a:buSzTx/>
+                        <a:buFontTx/>
+                        <a:buNone/>
+                        <a:tabLst/>
+                        <a:defRPr/>
+                      </a:pPr>
+                      <a:r>
+                        <a:rPr lang="fr-FR" sz="1200" dirty="0" err="1" smtClean="0"/>
+                        <a:t>Enabling</a:t>
+                      </a:r>
+                      <a:r>
+                        <a:rPr lang="fr-FR" sz="1200" dirty="0" smtClean="0"/>
+                        <a:t> people to switch on/off machines</a:t>
+                      </a:r>
+                    </a:p>
+                    <a:p>
+                      <a:pPr algn="ctr"/>
+                      <a:endParaRPr lang="fr-FR" sz="1200" dirty="0"/>
+                    </a:p>
+                  </a:txBody>
+                  <a:tcPr/>
+                </a:tc>
+                <a:tc>
+                  <a:txBody>
+                    <a:bodyPr/>
+                    <a:lstStyle/>
+                    <a:p>
+                      <a:pPr algn="ctr"/>
+                      <a:endParaRPr lang="fr-FR" dirty="0"/>
+                    </a:p>
+                  </a:txBody>
+                  <a:tcPr/>
+                </a:tc>
+              </a:tr>
+              <a:tr h="399262">
+                <a:tc>
+                  <a:txBody>
+                    <a:bodyPr/>
+                    <a:lstStyle/>
+                    <a:p>
+                      <a:pPr marL="0" marR="0" indent="0" algn="ctr" defTabSz="457200" rtl="0" eaLnBrk="1" fontAlgn="auto" latinLnBrk="0" hangingPunct="1">
+                        <a:lnSpc>
+                          <a:spcPct val="100000"/>
+                        </a:lnSpc>
+                        <a:spcBef>
+                          <a:spcPts val="0"/>
+                        </a:spcBef>
+                        <a:spcAft>
+                          <a:spcPts val="0"/>
+                        </a:spcAft>
+                        <a:buClrTx/>
+                        <a:buSzTx/>
+                        <a:buFontTx/>
+                        <a:buNone/>
+                        <a:tabLst/>
+                        <a:defRPr/>
+                      </a:pPr>
+                      <a:r>
+                        <a:rPr lang="fr-FR" sz="1200" dirty="0" err="1" smtClean="0"/>
+                        <a:t>Adapted</a:t>
+                      </a:r>
+                      <a:r>
+                        <a:rPr lang="fr-FR" sz="1200" dirty="0" smtClean="0"/>
+                        <a:t> to </a:t>
+                      </a:r>
+                      <a:r>
+                        <a:rPr lang="fr-FR" sz="1200" dirty="0" err="1" smtClean="0"/>
+                        <a:t>every</a:t>
+                      </a:r>
+                      <a:r>
+                        <a:rPr lang="fr-FR" sz="1200" dirty="0" smtClean="0"/>
+                        <a:t> </a:t>
+                      </a:r>
+                      <a:r>
+                        <a:rPr lang="fr-FR" sz="1200" dirty="0" err="1" smtClean="0"/>
+                        <a:t>disabled</a:t>
+                      </a:r>
+                      <a:r>
+                        <a:rPr lang="fr-FR" sz="1200" baseline="0" dirty="0" smtClean="0"/>
+                        <a:t> </a:t>
+                      </a:r>
+                      <a:r>
+                        <a:rPr lang="fr-FR" sz="1200" dirty="0" err="1" smtClean="0"/>
+                        <a:t>users</a:t>
+                      </a:r>
+                      <a:endParaRPr lang="fr-FR" sz="1200" dirty="0" smtClean="0"/>
+                    </a:p>
+                    <a:p>
+                      <a:pPr algn="ctr"/>
+                      <a:endParaRPr lang="fr-FR" sz="1200" dirty="0"/>
+                    </a:p>
+                  </a:txBody>
+                  <a:tcPr/>
+                </a:tc>
+                <a:tc>
+                  <a:txBody>
+                    <a:bodyPr/>
+                    <a:lstStyle/>
+                    <a:p>
+                      <a:pPr algn="ctr"/>
+                      <a:endParaRPr lang="fr-FR"/>
+                    </a:p>
+                  </a:txBody>
+                  <a:tcPr/>
+                </a:tc>
+              </a:tr>
+              <a:tr h="399262">
+                <a:tc>
+                  <a:txBody>
+                    <a:bodyPr/>
+                    <a:lstStyle/>
+                    <a:p>
+                      <a:pPr marL="0" marR="0" indent="0" algn="ctr" defTabSz="457200" rtl="0" eaLnBrk="1" fontAlgn="auto" latinLnBrk="0" hangingPunct="1">
+                        <a:lnSpc>
+                          <a:spcPct val="100000"/>
+                        </a:lnSpc>
+                        <a:spcBef>
+                          <a:spcPts val="0"/>
+                        </a:spcBef>
+                        <a:spcAft>
+                          <a:spcPts val="0"/>
+                        </a:spcAft>
+                        <a:buClrTx/>
+                        <a:buSzTx/>
+                        <a:buFontTx/>
+                        <a:buNone/>
+                        <a:tabLst/>
+                        <a:defRPr/>
+                      </a:pPr>
+                      <a:r>
+                        <a:rPr lang="fr-FR" sz="1200" dirty="0" smtClean="0"/>
+                        <a:t>A « scrolling » mode (traduction à revoir)</a:t>
+                      </a:r>
+                    </a:p>
+                    <a:p>
+                      <a:pPr algn="ctr"/>
+                      <a:endParaRPr lang="fr-FR" sz="1200" dirty="0"/>
+                    </a:p>
+                  </a:txBody>
+                  <a:tcPr/>
+                </a:tc>
+                <a:tc>
+                  <a:txBody>
+                    <a:bodyPr/>
+                    <a:lstStyle/>
+                    <a:p>
+                      <a:pPr algn="ctr"/>
+                      <a:endParaRPr lang="fr-FR"/>
+                    </a:p>
+                  </a:txBody>
+                  <a:tcPr/>
+                </a:tc>
+              </a:tr>
+              <a:tr h="399262">
+                <a:tc>
+                  <a:txBody>
+                    <a:bodyPr/>
+                    <a:lstStyle/>
+                    <a:p>
+                      <a:pPr marL="0" marR="0" indent="0" algn="ctr" defTabSz="457200" rtl="0" eaLnBrk="1" fontAlgn="auto" latinLnBrk="0" hangingPunct="1">
+                        <a:lnSpc>
+                          <a:spcPct val="100000"/>
+                        </a:lnSpc>
+                        <a:spcBef>
+                          <a:spcPts val="0"/>
+                        </a:spcBef>
+                        <a:spcAft>
+                          <a:spcPts val="0"/>
+                        </a:spcAft>
+                        <a:buClrTx/>
+                        <a:buSzTx/>
+                        <a:buFontTx/>
+                        <a:buNone/>
+                        <a:tabLst/>
+                        <a:defRPr/>
+                      </a:pPr>
+                      <a:r>
+                        <a:rPr lang="fr-FR" sz="1200" dirty="0" smtClean="0"/>
+                        <a:t>Configuration </a:t>
+                      </a:r>
+                      <a:r>
+                        <a:rPr lang="fr-FR" sz="1200" dirty="0" err="1" smtClean="0"/>
+                        <a:t>available</a:t>
+                      </a:r>
+                      <a:r>
+                        <a:rPr lang="fr-FR" sz="1200" dirty="0" smtClean="0"/>
+                        <a:t> </a:t>
+                      </a:r>
+                      <a:r>
+                        <a:rPr lang="fr-FR" sz="1200" dirty="0" err="1" smtClean="0"/>
+                        <a:t>only</a:t>
+                      </a:r>
+                      <a:r>
+                        <a:rPr lang="fr-FR" sz="1200" dirty="0" smtClean="0"/>
+                        <a:t> for</a:t>
+                      </a:r>
+                      <a:r>
+                        <a:rPr lang="fr-FR" sz="1200" baseline="0" dirty="0" smtClean="0"/>
+                        <a:t> the</a:t>
+                      </a:r>
+                      <a:r>
+                        <a:rPr lang="fr-FR" sz="1200" dirty="0" smtClean="0"/>
+                        <a:t> </a:t>
+                      </a:r>
+                      <a:r>
+                        <a:rPr lang="fr-FR" sz="1200" dirty="0" err="1" smtClean="0"/>
+                        <a:t>technician</a:t>
+                      </a:r>
+                      <a:endParaRPr lang="fr-FR" sz="1200" dirty="0" smtClean="0"/>
+                    </a:p>
+                    <a:p>
+                      <a:pPr algn="ctr"/>
+                      <a:endParaRPr lang="fr-FR" sz="1200" dirty="0"/>
+                    </a:p>
+                  </a:txBody>
+                  <a:tcPr/>
+                </a:tc>
+                <a:tc>
+                  <a:txBody>
+                    <a:bodyPr/>
+                    <a:lstStyle/>
+                    <a:p>
+                      <a:pPr algn="ctr"/>
+                      <a:endParaRPr lang="fr-FR"/>
+                    </a:p>
+                  </a:txBody>
+                  <a:tcPr/>
+                </a:tc>
+              </a:tr>
+              <a:tr h="501386">
+                <a:tc>
+                  <a:txBody>
+                    <a:bodyPr/>
+                    <a:lstStyle/>
+                    <a:p>
+                      <a:pPr marL="0" marR="0" indent="0" algn="ctr" defTabSz="457200" rtl="0" eaLnBrk="1" fontAlgn="auto" latinLnBrk="0" hangingPunct="1">
+                        <a:lnSpc>
+                          <a:spcPct val="100000"/>
+                        </a:lnSpc>
+                        <a:spcBef>
+                          <a:spcPts val="0"/>
+                        </a:spcBef>
+                        <a:spcAft>
+                          <a:spcPts val="0"/>
+                        </a:spcAft>
+                        <a:buClrTx/>
+                        <a:buSzTx/>
+                        <a:buFontTx/>
+                        <a:buNone/>
+                        <a:tabLst/>
+                        <a:defRPr/>
+                      </a:pPr>
+                      <a:r>
+                        <a:rPr lang="fr-FR" sz="1200" dirty="0" smtClean="0"/>
+                        <a:t>Feedback </a:t>
+                      </a:r>
+                      <a:r>
+                        <a:rPr lang="fr-FR" sz="1200" dirty="0" err="1" smtClean="0"/>
+                        <a:t>from</a:t>
+                      </a:r>
+                      <a:r>
+                        <a:rPr lang="fr-FR" sz="1200" dirty="0" smtClean="0"/>
+                        <a:t> the </a:t>
+                      </a:r>
+                      <a:r>
+                        <a:rPr lang="fr-FR" sz="1200" dirty="0" err="1" smtClean="0"/>
+                        <a:t>wheelchair</a:t>
+                      </a:r>
+                      <a:endParaRPr lang="fr-FR" sz="1200" dirty="0" smtClean="0"/>
+                    </a:p>
+                    <a:p>
+                      <a:pPr algn="ctr"/>
+                      <a:endParaRPr lang="fr-FR" sz="1200" dirty="0"/>
+                    </a:p>
+                  </a:txBody>
+                  <a:tcPr/>
+                </a:tc>
+                <a:tc>
+                  <a:txBody>
+                    <a:bodyPr/>
+                    <a:lstStyle/>
+                    <a:p>
+                      <a:pPr algn="ctr"/>
+                      <a:endParaRPr lang="fr-FR" dirty="0"/>
+                    </a:p>
+                  </a:txBody>
+                  <a:tcPr/>
+                </a:tc>
+              </a:tr>
+            </a:tbl>
+          </a:graphicData>
+        </a:graphic>
+      </p:graphicFrame>
     </p:spTree>
     <p:extLst>
       <p:ext uri="{BB962C8B-B14F-4D97-AF65-F5344CB8AC3E}">
@@ -9588,6 +10656,75 @@
       </p:transition>
     </mc:Choice>
     <mc:Fallback xmlns="">
+      <p:transition spd="med">
+        <p:fade/>
+      </p:transition>
+    </mc:Fallback>
+  </mc:AlternateContent>
+</p:sld>
+</file>
+
+<file path=ppt/slides/slide9.xml><?xml version="1.0" encoding="utf-8"?>
+<p:sld xmlns:a="http://schemas.openxmlformats.org/drawingml/2006/main" xmlns:r="http://schemas.openxmlformats.org/officeDocument/2006/relationships" xmlns:p="http://schemas.openxmlformats.org/presentationml/2006/main">
+  <p:cSld>
+    <p:spTree>
+      <p:nvGrpSpPr>
+        <p:cNvPr id="1" name=""/>
+        <p:cNvGrpSpPr/>
+        <p:nvPr/>
+      </p:nvGrpSpPr>
+      <p:grpSpPr>
+        <a:xfrm>
+          <a:off x="0" y="0"/>
+          <a:ext cx="0" cy="0"/>
+          <a:chOff x="0" y="0"/>
+          <a:chExt cx="0" cy="0"/>
+        </a:xfrm>
+      </p:grpSpPr>
+      <p:sp>
+        <p:nvSpPr>
+          <p:cNvPr id="4" name="Titre 3"/>
+          <p:cNvSpPr>
+            <a:spLocks noGrp="1"/>
+          </p:cNvSpPr>
+          <p:nvPr>
+            <p:ph type="ctrTitle"/>
+          </p:nvPr>
+        </p:nvSpPr>
+        <p:spPr/>
+        <p:txBody>
+          <a:bodyPr/>
+          <a:lstStyle/>
+          <a:p>
+            <a:r>
+              <a:rPr lang="fr-FR" dirty="0" err="1" smtClean="0"/>
+              <a:t>Pre</a:t>
+            </a:r>
+            <a:r>
+              <a:rPr lang="fr-FR" dirty="0" smtClean="0"/>
+              <a:t>-STUDY</a:t>
+            </a:r>
+            <a:endParaRPr lang="fr-FR" dirty="0"/>
+          </a:p>
+        </p:txBody>
+      </p:sp>
+    </p:spTree>
+    <p:extLst>
+      <p:ext uri="{BB962C8B-B14F-4D97-AF65-F5344CB8AC3E}">
+        <p14:creationId xmlns:p14="http://schemas.microsoft.com/office/powerpoint/2010/main" val="1383375859"/>
+      </p:ext>
+    </p:extLst>
+  </p:cSld>
+  <p:clrMapOvr>
+    <a:masterClrMapping/>
+  </p:clrMapOvr>
+  <mc:AlternateContent xmlns:mc="http://schemas.openxmlformats.org/markup-compatibility/2006">
+    <mc:Choice xmlns:p14="http://schemas.microsoft.com/office/powerpoint/2010/main" Requires="p14">
+      <p:transition spd="med" p14:dur="700">
+        <p:fade/>
+      </p:transition>
+    </mc:Choice>
+    <mc:Fallback>
       <p:transition spd="med">
         <p:fade/>
       </p:transition>

</xml_diff>

<commit_message>
Ajout du logo dans le diapo
</commit_message>
<xml_diff>
--- a/Rendu/Diapo_prototype_janvier.pptx
+++ b/Rendu/Diapo_prototype_janvier.pptx
@@ -129,7 +129,7 @@
   </p:defaultTextStyle>
   <p:extLst>
     <p:ext uri="{EFAFB233-063F-42B5-8137-9DF3F51BA10A}">
-      <p15:sldGuideLst xmlns:p15="http://schemas.microsoft.com/office/powerpoint/2012/main" xmlns="">
+      <p15:sldGuideLst xmlns="" xmlns:p15="http://schemas.microsoft.com/office/powerpoint/2012/main">
         <p15:guide id="1" orient="horz" pos="1620">
           <p15:clr>
             <a:srgbClr val="A4A3A4"/>
@@ -249,7 +249,7 @@
             <a:fld id="{1FF860C4-84CC-4ED2-86B7-24C0345B37D5}" type="datetimeFigureOut">
               <a:rPr lang="fr-FR" smtClean="0"/>
               <a:pPr/>
-              <a:t>08/12/2015</a:t>
+              <a:t>10/12/2015</a:t>
             </a:fld>
             <a:endParaRPr lang="fr-FR"/>
           </a:p>
@@ -416,7 +416,7 @@
             <a:fld id="{C2C2714D-4FF2-4E25-9D9C-3A52AC0061D5}" type="datetimeFigureOut">
               <a:rPr lang="fr-FR" smtClean="0"/>
               <a:pPr/>
-              <a:t>08/12/2015</a:t>
+              <a:t>10/12/2015</a:t>
             </a:fld>
             <a:endParaRPr lang="fr-FR"/>
           </a:p>
@@ -7017,6 +7017,47 @@
           </a:p>
         </p:txBody>
       </p:sp>
+      <p:pic>
+        <p:nvPicPr>
+          <p:cNvPr id="1026" name="Picture 2" descr="Z:\home\maki\Dropbox\3e_annee\Projet\git\EP_Domotique_Tablette\Rendu\logo_ergovie.jpg"/>
+          <p:cNvPicPr>
+            <a:picLocks noChangeAspect="1" noChangeArrowheads="1"/>
+          </p:cNvPicPr>
+          <p:nvPr/>
+        </p:nvPicPr>
+        <p:blipFill>
+          <a:blip r:embed="rId3">
+            <a:extLst>
+              <a:ext uri="{28A0092B-C50C-407E-A947-70E740481C1C}">
+                <a14:useLocalDpi xmlns:a14="http://schemas.microsoft.com/office/drawing/2010/main" val="0"/>
+              </a:ext>
+            </a:extLst>
+          </a:blip>
+          <a:srcRect/>
+          <a:stretch>
+            <a:fillRect/>
+          </a:stretch>
+        </p:blipFill>
+        <p:spPr bwMode="auto">
+          <a:xfrm>
+            <a:off x="3933825" y="3202145"/>
+            <a:ext cx="2169763" cy="1600200"/>
+          </a:xfrm>
+          <a:prstGeom prst="rect">
+            <a:avLst/>
+          </a:prstGeom>
+          <a:noFill/>
+          <a:extLst>
+            <a:ext uri="{909E8E84-426E-40DD-AFC4-6F175D3DCCD1}">
+              <a14:hiddenFill xmlns:a14="http://schemas.microsoft.com/office/drawing/2010/main">
+                <a:solidFill>
+                  <a:srgbClr val="FFFFFF"/>
+                </a:solidFill>
+              </a14:hiddenFill>
+            </a:ext>
+          </a:extLst>
+        </p:spPr>
+      </p:pic>
     </p:spTree>
     <p:extLst>
       <p:ext uri="{BB962C8B-B14F-4D97-AF65-F5344CB8AC3E}">
@@ -10516,7 +10557,6 @@
               <a:rPr lang="fr-FR" dirty="0" smtClean="0"/>
               <a:t>Conclusion</a:t>
             </a:r>
-            <a:endParaRPr lang="fr-FR" dirty="0" smtClean="0"/>
           </a:p>
         </p:txBody>
       </p:sp>

</xml_diff>

<commit_message>
Modif diapo + ajout images
</commit_message>
<xml_diff>
--- a/Rendu/Diapo_prototype_janvier.pptx
+++ b/Rendu/Diapo_prototype_janvier.pptx
@@ -266,7 +266,7 @@
             <a:fld id="{1FF860C4-84CC-4ED2-86B7-24C0345B37D5}" type="datetimeFigureOut">
               <a:rPr lang="fr-FR" smtClean="0"/>
               <a:pPr/>
-              <a:t>17/12/2015</a:t>
+              <a:t>02/01/2016</a:t>
             </a:fld>
             <a:endParaRPr lang="fr-FR"/>
           </a:p>
@@ -433,7 +433,7 @@
             <a:fld id="{C2C2714D-4FF2-4E25-9D9C-3A52AC0061D5}" type="datetimeFigureOut">
               <a:rPr lang="fr-FR" smtClean="0"/>
               <a:pPr/>
-              <a:t>17/12/2015</a:t>
+              <a:t>02/01/2016</a:t>
             </a:fld>
             <a:endParaRPr lang="fr-FR"/>
           </a:p>
@@ -6770,6 +6770,14 @@
 <file path=ppt/slides/slide1.xml><?xml version="1.0" encoding="utf-8"?>
 <p:sld xmlns:a="http://schemas.openxmlformats.org/drawingml/2006/main" xmlns:r="http://schemas.openxmlformats.org/officeDocument/2006/relationships" xmlns:p="http://schemas.openxmlformats.org/presentationml/2006/main">
   <p:cSld>
+    <p:bg>
+      <p:bgPr>
+        <a:solidFill>
+          <a:schemeClr val="bg1"/>
+        </a:solidFill>
+        <a:effectLst/>
+      </p:bgPr>
+    </p:bg>
     <p:spTree>
       <p:nvGrpSpPr>
         <p:cNvPr id="1" name=""/>
@@ -6784,76 +6792,6 @@
           <a:chExt cx="0" cy="0"/>
         </a:xfrm>
       </p:grpSpPr>
-      <p:sp>
-        <p:nvSpPr>
-          <p:cNvPr id="4" name="Rectangle 3"/>
-          <p:cNvSpPr/>
-          <p:nvPr/>
-        </p:nvSpPr>
-        <p:spPr>
-          <a:xfrm>
-            <a:off x="1357068" y="2494625"/>
-            <a:ext cx="6979410" cy="954107"/>
-          </a:xfrm>
-          <a:prstGeom prst="rect">
-            <a:avLst/>
-          </a:prstGeom>
-          <a:solidFill>
-            <a:schemeClr val="bg1">
-              <a:lumMod val="95000"/>
-            </a:schemeClr>
-          </a:solidFill>
-          <a:ln>
-            <a:solidFill>
-              <a:srgbClr val="ABD3C9"/>
-            </a:solidFill>
-          </a:ln>
-          <a:effectLst>
-            <a:outerShdw blurRad="50800" dist="38100" dir="8100000" algn="tr" rotWithShape="0">
-              <a:prstClr val="black">
-                <a:alpha val="40000"/>
-              </a:prstClr>
-            </a:outerShdw>
-            <a:softEdge rad="31750"/>
-          </a:effectLst>
-        </p:spPr>
-        <p:style>
-          <a:lnRef idx="1">
-            <a:schemeClr val="dk1"/>
-          </a:lnRef>
-          <a:fillRef idx="2">
-            <a:schemeClr val="dk1"/>
-          </a:fillRef>
-          <a:effectRef idx="1">
-            <a:schemeClr val="dk1"/>
-          </a:effectRef>
-          <a:fontRef idx="minor">
-            <a:schemeClr val="dk1"/>
-          </a:fontRef>
-        </p:style>
-        <p:txBody>
-          <a:bodyPr wrap="square">
-            <a:spAutoFit/>
-          </a:bodyPr>
-          <a:lstStyle/>
-          <a:p>
-            <a:pPr algn="ctr"/>
-            <a:r>
-              <a:rPr lang="fr-FR" altLang="fr-FR" sz="2800" b="1" dirty="0">
-                <a:latin typeface="Arial Black" pitchFamily="34" charset="0"/>
-                <a:cs typeface="Arial" charset="0"/>
-              </a:rPr>
-              <a:t>Home Automation Control Interface On Windows Tablet</a:t>
-            </a:r>
-            <a:endParaRPr lang="fr-FR" altLang="fr-FR" sz="2800" b="1" dirty="0">
-              <a:solidFill>
-                <a:schemeClr val="tx2"/>
-              </a:solidFill>
-              <a:latin typeface="Arial Black" pitchFamily="34" charset="0"/>
-            </a:endParaRPr>
-          </a:p>
-        </p:txBody>
-      </p:sp>
       <p:graphicFrame>
         <p:nvGraphicFramePr>
           <p:cNvPr id="7" name="Tableau 6"/>
@@ -6863,13 +6801,13 @@
           <p:nvPr>
             <p:extLst>
               <p:ext uri="{D42A27DB-BD31-4B8C-83A1-F6EECF244321}">
-                <p14:modId xmlns:p14="http://schemas.microsoft.com/office/powerpoint/2010/main" val="2659550679"/>
+                <p14:modId xmlns:p14="http://schemas.microsoft.com/office/powerpoint/2010/main" val="2534338684"/>
               </p:ext>
             </p:extLst>
           </p:nvPr>
         </p:nvGraphicFramePr>
         <p:xfrm>
-          <a:off x="3693226" y="4409043"/>
+          <a:off x="4052280" y="4400067"/>
           <a:ext cx="4643252" cy="2011680"/>
         </p:xfrm>
         <a:graphic>
@@ -6888,12 +6826,16 @@
                     <a:bodyPr/>
                     <a:lstStyle/>
                     <a:p>
-                      <a:pPr marL="0" indent="0">
+                      <a:pPr marL="0" indent="0" algn="ctr">
                         <a:buFont typeface="Arial"/>
                         <a:buNone/>
                       </a:pPr>
                       <a:r>
-                        <a:rPr lang="en-US" dirty="0" smtClean="0"/>
+                        <a:rPr lang="en-US" dirty="0" smtClean="0">
+                          <a:solidFill>
+                            <a:srgbClr val="ED271A"/>
+                          </a:solidFill>
+                        </a:rPr>
                         <a:t>Tutors</a:t>
                       </a:r>
                       <a:r>
@@ -6902,9 +6844,11 @@
                       </a:r>
                     </a:p>
                     <a:p>
+                      <a:pPr algn="ctr"/>
                       <a:endParaRPr lang="en-US" baseline="0" dirty="0" smtClean="0"/>
                     </a:p>
                     <a:p>
+                      <a:pPr algn="ctr"/>
                       <a:r>
                         <a:rPr lang="en-US" baseline="0" dirty="0" smtClean="0"/>
                         <a:t>François </a:t>
@@ -6913,14 +6857,10 @@
                         <a:rPr lang="en-US" baseline="0" dirty="0" err="1" smtClean="0"/>
                         <a:t>Pasteau</a:t>
                       </a:r>
+                      <a:endParaRPr lang="en-US" baseline="0" dirty="0" smtClean="0"/>
                     </a:p>
                     <a:p>
-                      <a:r>
-                        <a:rPr lang="en-US" baseline="0" dirty="0" smtClean="0"/>
-                        <a:t>Marie Babel</a:t>
-                      </a:r>
-                    </a:p>
-                    <a:p>
+                      <a:pPr algn="ctr"/>
                       <a:r>
                         <a:rPr lang="en-US" baseline="0" dirty="0" smtClean="0"/>
                         <a:t>Daniel </a:t>
@@ -6928,6 +6868,14 @@
                       <a:r>
                         <a:rPr lang="en-US" baseline="0" dirty="0" err="1" smtClean="0"/>
                         <a:t>Guillard</a:t>
+                      </a:r>
+                      <a:endParaRPr lang="en-US" baseline="0" dirty="0" smtClean="0"/>
+                    </a:p>
+                    <a:p>
+                      <a:pPr algn="ctr"/>
+                      <a:r>
+                        <a:rPr lang="en-US" baseline="0" dirty="0" smtClean="0"/>
+                        <a:t>Marie Babel</a:t>
                       </a:r>
                       <a:endParaRPr lang="en-US" baseline="0" dirty="0" smtClean="0"/>
                     </a:p>
@@ -6939,23 +6887,33 @@
                     <a:bodyPr/>
                     <a:lstStyle/>
                     <a:p>
-                      <a:pPr marL="0" indent="0">
+                      <a:pPr marL="0" indent="0" algn="ctr">
                         <a:buFont typeface="Arial"/>
                         <a:buNone/>
                       </a:pPr>
                       <a:r>
-                        <a:rPr lang="en-US" dirty="0" smtClean="0"/>
+                        <a:rPr lang="en-US" dirty="0" smtClean="0">
+                          <a:solidFill>
+                            <a:srgbClr val="ED271A"/>
+                          </a:solidFill>
+                        </a:rPr>
                         <a:t>Team members</a:t>
                       </a:r>
                       <a:r>
-                        <a:rPr lang="en-US" baseline="0" dirty="0" smtClean="0"/>
+                        <a:rPr lang="en-US" baseline="0" dirty="0" smtClean="0">
+                          <a:solidFill>
+                            <a:srgbClr val="ED271A"/>
+                          </a:solidFill>
+                        </a:rPr>
                         <a:t> </a:t>
                       </a:r>
                     </a:p>
                     <a:p>
+                      <a:pPr algn="ctr"/>
                       <a:endParaRPr lang="en-US" baseline="0" dirty="0" smtClean="0"/>
                     </a:p>
                     <a:p>
+                      <a:pPr algn="ctr"/>
                       <a:r>
                         <a:rPr lang="en-US" baseline="0" dirty="0" err="1" smtClean="0"/>
                         <a:t>Iman</a:t>
@@ -6971,6 +6929,7 @@
                       <a:endParaRPr lang="en-US" baseline="0" dirty="0" smtClean="0"/>
                     </a:p>
                     <a:p>
+                      <a:pPr algn="ctr"/>
                       <a:r>
                         <a:rPr lang="en-US" baseline="0" dirty="0" smtClean="0"/>
                         <a:t>Diane </a:t>
@@ -6982,6 +6941,7 @@
                       <a:endParaRPr lang="en-US" baseline="0" dirty="0" smtClean="0"/>
                     </a:p>
                     <a:p>
+                      <a:pPr algn="ctr"/>
                       <a:r>
                         <a:rPr lang="en-US" baseline="0" dirty="0" err="1" smtClean="0"/>
                         <a:t>Enora</a:t>
@@ -6992,6 +6952,7 @@
                       </a:r>
                     </a:p>
                     <a:p>
+                      <a:pPr algn="ctr"/>
                       <a:r>
                         <a:rPr lang="en-US" baseline="0" dirty="0" err="1" smtClean="0"/>
                         <a:t>Meven</a:t>
@@ -7002,6 +6963,7 @@
                       </a:r>
                     </a:p>
                     <a:p>
+                      <a:pPr algn="ctr"/>
                       <a:r>
                         <a:rPr lang="en-US" baseline="0" dirty="0" err="1" smtClean="0"/>
                         <a:t>Corentin</a:t>
@@ -7032,8 +6994,8 @@
         </p:nvSpPr>
         <p:spPr>
           <a:xfrm>
-            <a:off x="3883231" y="3645725"/>
-            <a:ext cx="2903359" cy="369332"/>
+            <a:off x="4851694" y="3633398"/>
+            <a:ext cx="3044423" cy="369332"/>
           </a:xfrm>
           <a:prstGeom prst="rect">
             <a:avLst/>
@@ -7047,10 +7009,125 @@
           <a:lstStyle/>
           <a:p>
             <a:r>
-              <a:rPr lang="en-US" dirty="0" smtClean="0"/>
+              <a:rPr lang="en-US" b="1" dirty="0" smtClean="0"/>
               <a:t>Practical study 06/01/2016</a:t>
             </a:r>
-            <a:endParaRPr lang="fr-FR" dirty="0"/>
+            <a:endParaRPr lang="fr-FR" b="1" dirty="0"/>
+          </a:p>
+        </p:txBody>
+      </p:sp>
+      <p:sp>
+        <p:nvSpPr>
+          <p:cNvPr id="2" name="Rectangle 1"/>
+          <p:cNvSpPr/>
+          <p:nvPr/>
+        </p:nvSpPr>
+        <p:spPr>
+          <a:xfrm>
+            <a:off x="731813" y="1789511"/>
+            <a:ext cx="7963719" cy="1446550"/>
+          </a:xfrm>
+          <a:prstGeom prst="rect">
+            <a:avLst/>
+          </a:prstGeom>
+          <a:noFill/>
+        </p:spPr>
+        <p:txBody>
+          <a:bodyPr wrap="none" lIns="91440" tIns="45720" rIns="91440" bIns="45720">
+            <a:spAutoFit/>
+          </a:bodyPr>
+          <a:lstStyle/>
+          <a:p>
+            <a:pPr algn="ctr"/>
+            <a:r>
+              <a:rPr lang="fr-FR" sz="4400" b="1" cap="none" spc="50" dirty="0" smtClean="0">
+                <a:ln w="0"/>
+                <a:solidFill>
+                  <a:schemeClr val="bg2"/>
+                </a:solidFill>
+                <a:effectLst>
+                  <a:innerShdw blurRad="63500" dist="50800" dir="13500000">
+                    <a:srgbClr val="000000">
+                      <a:alpha val="50000"/>
+                    </a:srgbClr>
+                  </a:innerShdw>
+                </a:effectLst>
+              </a:rPr>
+              <a:t>Home Automation Control</a:t>
+            </a:r>
+          </a:p>
+          <a:p>
+            <a:pPr algn="ctr"/>
+            <a:r>
+              <a:rPr lang="fr-FR" sz="4400" b="1" spc="50" dirty="0" smtClean="0">
+                <a:ln w="0"/>
+                <a:solidFill>
+                  <a:schemeClr val="bg2"/>
+                </a:solidFill>
+                <a:effectLst>
+                  <a:innerShdw blurRad="63500" dist="50800" dir="13500000">
+                    <a:srgbClr val="000000">
+                      <a:alpha val="50000"/>
+                    </a:srgbClr>
+                  </a:innerShdw>
+                </a:effectLst>
+              </a:rPr>
+              <a:t>Interface on Windows Tablet</a:t>
+            </a:r>
+            <a:endParaRPr lang="fr-FR" sz="4400" b="1" cap="none" spc="50" dirty="0">
+              <a:ln w="0"/>
+              <a:solidFill>
+                <a:schemeClr val="bg2"/>
+              </a:solidFill>
+              <a:effectLst>
+                <a:innerShdw blurRad="63500" dist="50800" dir="13500000">
+                  <a:srgbClr val="000000">
+                    <a:alpha val="50000"/>
+                  </a:srgbClr>
+                </a:innerShdw>
+              </a:effectLst>
+            </a:endParaRPr>
+          </a:p>
+        </p:txBody>
+      </p:sp>
+      <p:sp>
+        <p:nvSpPr>
+          <p:cNvPr id="5" name="Triangle rectangle 4"/>
+          <p:cNvSpPr/>
+          <p:nvPr/>
+        </p:nvSpPr>
+        <p:spPr>
+          <a:xfrm>
+            <a:off x="1" y="3953814"/>
+            <a:ext cx="3979572" cy="2904186"/>
+          </a:xfrm>
+          <a:prstGeom prst="rtTriangle">
+            <a:avLst/>
+          </a:prstGeom>
+          <a:solidFill>
+            <a:srgbClr val="FF0000"/>
+          </a:solidFill>
+        </p:spPr>
+        <p:style>
+          <a:lnRef idx="1">
+            <a:schemeClr val="accent1"/>
+          </a:lnRef>
+          <a:fillRef idx="3">
+            <a:schemeClr val="accent1"/>
+          </a:fillRef>
+          <a:effectRef idx="2">
+            <a:schemeClr val="accent1"/>
+          </a:effectRef>
+          <a:fontRef idx="minor">
+            <a:schemeClr val="lt1"/>
+          </a:fontRef>
+        </p:style>
+        <p:txBody>
+          <a:bodyPr rtlCol="0" anchor="ctr"/>
+          <a:lstStyle/>
+          <a:p>
+            <a:pPr algn="ctr"/>
+            <a:endParaRPr lang="fr-FR"/>
           </a:p>
         </p:txBody>
       </p:sp>
@@ -9479,13 +9556,13 @@
   <p:clrMapOvr>
     <a:masterClrMapping/>
   </p:clrMapOvr>
-  <mc:AlternateContent xmlns:mc="http://schemas.openxmlformats.org/markup-compatibility/2006">
-    <mc:Choice xmlns:p14="http://schemas.microsoft.com/office/powerpoint/2010/main" Requires="p14">
+  <mc:AlternateContent xmlns:mc="http://schemas.openxmlformats.org/markup-compatibility/2006" xmlns:p14="http://schemas.microsoft.com/office/powerpoint/2010/main">
+    <mc:Choice Requires="p14">
       <p:transition spd="med" p14:dur="700">
         <p:fade/>
       </p:transition>
     </mc:Choice>
-    <mc:Fallback>
+    <mc:Fallback xmlns="">
       <p:transition spd="med">
         <p:fade/>
       </p:transition>
@@ -10462,7 +10539,19 @@
           <a:p>
             <a:r>
               <a:rPr lang="en-US" dirty="0" smtClean="0"/>
-              <a:t>Make it portable : translate all the algorithm in C++</a:t>
+              <a:t>Make it </a:t>
+            </a:r>
+            <a:r>
+              <a:rPr lang="en-US" dirty="0" smtClean="0"/>
+              <a:t>transferable</a:t>
+            </a:r>
+            <a:r>
+              <a:rPr lang="en-US" dirty="0" smtClean="0"/>
+              <a:t> </a:t>
+            </a:r>
+            <a:r>
+              <a:rPr lang="en-US" dirty="0" smtClean="0"/>
+              <a:t>: translate all the algorithm in C++</a:t>
             </a:r>
             <a:endParaRPr lang="en-US" dirty="0"/>
           </a:p>
@@ -10638,23 +10727,7 @@
             </a:r>
             <a:r>
               <a:rPr lang="fr-FR" dirty="0" err="1" smtClean="0"/>
-              <a:t>will</a:t>
-            </a:r>
-            <a:r>
-              <a:rPr lang="fr-FR" dirty="0" smtClean="0"/>
-              <a:t> </a:t>
-            </a:r>
-            <a:r>
-              <a:rPr lang="fr-FR" dirty="0" err="1" smtClean="0"/>
               <a:t>learn</a:t>
-            </a:r>
-            <a:r>
-              <a:rPr lang="fr-FR" dirty="0" smtClean="0"/>
-              <a:t> / have </a:t>
-            </a:r>
-            <a:r>
-              <a:rPr lang="fr-FR" dirty="0" err="1" smtClean="0"/>
-              <a:t>learnt</a:t>
             </a:r>
             <a:endParaRPr lang="fr-FR" dirty="0" smtClean="0"/>
           </a:p>
@@ -12097,20 +12170,19 @@
               <a:rPr lang="fr-FR" dirty="0"/>
               <a:t>5</a:t>
             </a:r>
-            <a:endParaRPr lang="fr-FR" dirty="0"/>
           </a:p>
         </p:txBody>
       </p:sp>
       <p:pic>
         <p:nvPicPr>
-          <p:cNvPr id="3" name="Image 2"/>
+          <p:cNvPr id="2" name="Image 1"/>
           <p:cNvPicPr>
             <a:picLocks noChangeAspect="1"/>
           </p:cNvPicPr>
           <p:nvPr/>
         </p:nvPicPr>
         <p:blipFill>
-          <a:blip r:embed="rId2">
+          <a:blip r:embed="rId2" cstate="screen">
             <a:extLst>
               <a:ext uri="{28A0092B-C50C-407E-A947-70E740481C1C}">
                 <a14:useLocalDpi xmlns:a14="http://schemas.microsoft.com/office/drawing/2010/main" val="0"/>
@@ -12123,8 +12195,8 @@
         </p:blipFill>
         <p:spPr>
           <a:xfrm>
-            <a:off x="0" y="968097"/>
-            <a:ext cx="9144000" cy="5327928"/>
+            <a:off x="0" y="857250"/>
+            <a:ext cx="9144000" cy="5143500"/>
           </a:xfrm>
           <a:prstGeom prst="rect">
             <a:avLst/>
@@ -12251,7 +12323,7 @@
           <p:nvPr>
             <p:extLst>
               <p:ext uri="{D42A27DB-BD31-4B8C-83A1-F6EECF244321}">
-                <p14:modId xmlns:p14="http://schemas.microsoft.com/office/powerpoint/2010/main" val="534321825"/>
+                <p14:modId xmlns:p14="http://schemas.microsoft.com/office/powerpoint/2010/main" val="2198630972"/>
               </p:ext>
             </p:extLst>
           </p:nvPr>
@@ -12275,6 +12347,7 @@
                     <a:bodyPr/>
                     <a:lstStyle/>
                     <a:p>
+                      <a:pPr algn="ctr"/>
                       <a:r>
                         <a:rPr lang="fr-FR" dirty="0" smtClean="0"/>
                         <a:t>Communication</a:t>
@@ -12282,7 +12355,7 @@
                       <a:endParaRPr lang="fr-FR" dirty="0"/>
                     </a:p>
                   </a:txBody>
-                  <a:tcPr/>
+                  <a:tcPr anchor="ctr"/>
                 </a:tc>
               </a:tr>
               <a:tr h="998368">
@@ -12560,8 +12633,8 @@
         </p:nvSpPr>
         <p:spPr>
           <a:xfrm>
-            <a:off x="2436236" y="249057"/>
-            <a:ext cx="7876388" cy="1143000"/>
+            <a:off x="2712374" y="304931"/>
+            <a:ext cx="3899557" cy="1143000"/>
           </a:xfrm>
         </p:spPr>
         <p:txBody>
@@ -12589,14 +12662,14 @@
           <p:nvPr>
             <p:extLst>
               <p:ext uri="{D42A27DB-BD31-4B8C-83A1-F6EECF244321}">
-                <p14:modId xmlns:p14="http://schemas.microsoft.com/office/powerpoint/2010/main" val="2797784101"/>
+                <p14:modId xmlns:p14="http://schemas.microsoft.com/office/powerpoint/2010/main" val="4229103733"/>
               </p:ext>
             </p:extLst>
           </p:nvPr>
         </p:nvGraphicFramePr>
         <p:xfrm>
-          <a:off x="965915" y="1210614"/>
-          <a:ext cx="6507513" cy="4534303"/>
+          <a:off x="1318244" y="1210614"/>
+          <a:ext cx="6507513" cy="4192329"/>
         </p:xfrm>
         <a:graphic>
           <a:graphicData uri="http://schemas.openxmlformats.org/drawingml/2006/table">
@@ -12613,6 +12686,7 @@
                     <a:bodyPr/>
                     <a:lstStyle/>
                     <a:p>
+                      <a:pPr algn="ctr"/>
                       <a:r>
                         <a:rPr lang="fr-FR" dirty="0" smtClean="0"/>
                         <a:t>GUI</a:t>
@@ -12620,10 +12694,10 @@
                       <a:endParaRPr lang="fr-FR" dirty="0"/>
                     </a:p>
                   </a:txBody>
-                  <a:tcPr/>
+                  <a:tcPr anchor="ctr"/>
                 </a:tc>
               </a:tr>
-              <a:tr h="1519395">
+              <a:tr h="1177421">
                 <a:tc>
                   <a:txBody>
                     <a:bodyPr/>
@@ -12714,8 +12788,8 @@
                     <a:lstStyle/>
                     <a:p>
                       <a:r>
-                        <a:rPr lang="fr-FR" dirty="0" smtClean="0"/>
-                        <a:t>Portable</a:t>
+                        <a:rPr lang="fr-FR" dirty="0" err="1" smtClean="0"/>
+                        <a:t>Transferable</a:t>
                       </a:r>
                       <a:endParaRPr lang="fr-FR" dirty="0"/>
                     </a:p>
@@ -12793,7 +12867,6 @@
               <a:rPr lang="fr-FR" dirty="0"/>
               <a:t>7</a:t>
             </a:r>
-            <a:endParaRPr lang="fr-FR" dirty="0"/>
           </a:p>
         </p:txBody>
       </p:sp>
@@ -13083,11 +13156,7 @@
           <a:p>
             <a:r>
               <a:rPr lang="fr-FR" dirty="0" smtClean="0"/>
-              <a:t>III.PRE </a:t>
-            </a:r>
-            <a:r>
-              <a:rPr lang="fr-FR" dirty="0" smtClean="0"/>
-              <a:t>STUDY</a:t>
+              <a:t>III.PRE STUDY</a:t>
             </a:r>
             <a:endParaRPr lang="fr-FR" dirty="0"/>
           </a:p>
@@ -13134,83 +13203,34 @@
             <a:endParaRPr lang="fr-FR" dirty="0" smtClean="0"/>
           </a:p>
           <a:p>
-            <a:pPr marL="457200" lvl="1" indent="0">
-              <a:buNone/>
-            </a:pPr>
-            <a:r>
-              <a:rPr lang="fr-FR" dirty="0" err="1">
-                <a:solidFill>
-                  <a:schemeClr val="tx1"/>
-                </a:solidFill>
-              </a:rPr>
-              <a:t>Root</a:t>
-            </a:r>
-            <a:r>
-              <a:rPr lang="fr-FR" dirty="0">
-                <a:solidFill>
-                  <a:schemeClr val="tx1"/>
-                </a:solidFill>
-              </a:rPr>
-              <a:t> : </a:t>
-            </a:r>
-            <a:r>
-              <a:rPr lang="fr-FR" dirty="0" err="1">
-                <a:solidFill>
-                  <a:schemeClr val="tx1"/>
-                </a:solidFill>
-              </a:rPr>
-              <a:t>homepage</a:t>
-            </a:r>
-            <a:endParaRPr lang="fr-FR" dirty="0">
-              <a:solidFill>
-                <a:schemeClr val="tx1"/>
-              </a:solidFill>
-            </a:endParaRPr>
-          </a:p>
-          <a:p>
-            <a:pPr marL="457200" lvl="1" indent="0">
-              <a:buNone/>
-            </a:pPr>
-            <a:r>
-              <a:rPr lang="fr-FR" dirty="0">
-                <a:solidFill>
-                  <a:schemeClr val="tx1"/>
-                </a:solidFill>
-              </a:rPr>
-              <a:t>Sons : </a:t>
-            </a:r>
-            <a:r>
-              <a:rPr lang="fr-FR" dirty="0" err="1">
-                <a:solidFill>
-                  <a:schemeClr val="tx1"/>
-                </a:solidFill>
-              </a:rPr>
-              <a:t>rooms</a:t>
-            </a:r>
-            <a:r>
-              <a:rPr lang="fr-FR" dirty="0">
-                <a:solidFill>
-                  <a:schemeClr val="tx1"/>
-                </a:solidFill>
-              </a:rPr>
-              <a:t> -&gt; </a:t>
-            </a:r>
-            <a:r>
-              <a:rPr lang="fr-FR" dirty="0" err="1" smtClean="0">
-                <a:solidFill>
-                  <a:schemeClr val="tx1"/>
-                </a:solidFill>
-              </a:rPr>
-              <a:t>equipments</a:t>
-            </a:r>
-            <a:endParaRPr lang="fr-FR" dirty="0">
-              <a:solidFill>
-                <a:schemeClr val="tx1"/>
-              </a:solidFill>
-            </a:endParaRPr>
-          </a:p>
-          <a:p>
             <a:endParaRPr lang="fr-FR" dirty="0"/>
+          </a:p>
+          <a:p>
+            <a:endParaRPr lang="fr-FR" dirty="0" smtClean="0"/>
+          </a:p>
+          <a:p>
+            <a:endParaRPr lang="fr-FR" dirty="0"/>
+          </a:p>
+          <a:p>
+            <a:endParaRPr lang="fr-FR" dirty="0" smtClean="0"/>
+          </a:p>
+          <a:p>
+            <a:endParaRPr lang="fr-FR" dirty="0"/>
+          </a:p>
+          <a:p>
+            <a:endParaRPr lang="fr-FR" dirty="0" smtClean="0"/>
+          </a:p>
+          <a:p>
+            <a:endParaRPr lang="fr-FR" dirty="0"/>
+          </a:p>
+          <a:p>
+            <a:endParaRPr lang="fr-FR" dirty="0" smtClean="0"/>
+          </a:p>
+          <a:p>
+            <a:endParaRPr lang="fr-FR" dirty="0"/>
+          </a:p>
+          <a:p>
+            <a:endParaRPr lang="fr-FR" dirty="0" smtClean="0"/>
           </a:p>
           <a:p>
             <a:r>
@@ -13307,6 +13327,36 @@
           </a:p>
         </p:txBody>
       </p:sp>
+      <p:pic>
+        <p:nvPicPr>
+          <p:cNvPr id="5" name="Image 4"/>
+          <p:cNvPicPr>
+            <a:picLocks noChangeAspect="1"/>
+          </p:cNvPicPr>
+          <p:nvPr/>
+        </p:nvPicPr>
+        <p:blipFill>
+          <a:blip r:embed="rId2" cstate="screen">
+            <a:extLst>
+              <a:ext uri="{28A0092B-C50C-407E-A947-70E740481C1C}">
+                <a14:useLocalDpi xmlns:a14="http://schemas.microsoft.com/office/drawing/2010/main" val="0"/>
+              </a:ext>
+            </a:extLst>
+          </a:blip>
+          <a:stretch>
+            <a:fillRect/>
+          </a:stretch>
+        </p:blipFill>
+        <p:spPr>
+          <a:xfrm>
+            <a:off x="2358041" y="1771167"/>
+            <a:ext cx="4427918" cy="3542334"/>
+          </a:xfrm>
+          <a:prstGeom prst="rect">
+            <a:avLst/>
+          </a:prstGeom>
+        </p:spPr>
+      </p:pic>
     </p:spTree>
     <p:extLst>
       <p:ext uri="{BB962C8B-B14F-4D97-AF65-F5344CB8AC3E}">

</xml_diff>

<commit_message>
Correction faute de frappe
</commit_message>
<xml_diff>
--- a/Rendu/Diapo_prototype_janvier.pptx
+++ b/Rendu/Diapo_prototype_janvier.pptx
@@ -7900,6 +7900,13 @@
       </p:transition>
     </mc:Fallback>
   </mc:AlternateContent>
+  <p:timing>
+    <p:tnLst>
+      <p:par>
+        <p:cTn id="1" dur="indefinite" restart="never" nodeType="tmRoot"/>
+      </p:par>
+    </p:tnLst>
+  </p:timing>
 </p:sld>
 </file>
 
@@ -10096,19 +10103,7 @@
           <a:p>
             <a:r>
               <a:rPr lang="en-US" dirty="0" smtClean="0"/>
-              <a:t>Make it </a:t>
-            </a:r>
-            <a:r>
-              <a:rPr lang="en-US" dirty="0" smtClean="0"/>
-              <a:t>portable</a:t>
-            </a:r>
-            <a:r>
-              <a:rPr lang="en-US" dirty="0" smtClean="0"/>
-              <a:t> </a:t>
-            </a:r>
-            <a:r>
-              <a:rPr lang="en-US" dirty="0" smtClean="0"/>
-              <a:t>: translate all the algorithm in C++</a:t>
+              <a:t>Make it portable : translate all the algorithm in C++</a:t>
             </a:r>
             <a:endParaRPr lang="en-US" dirty="0"/>
           </a:p>
@@ -12422,7 +12417,6 @@
                         <a:rPr lang="fr-FR" dirty="0" smtClean="0"/>
                         <a:t>Portable</a:t>
                       </a:r>
-                      <a:endParaRPr lang="fr-FR" dirty="0" smtClean="0"/>
                     </a:p>
                     <a:p>
                       <a:endParaRPr lang="fr-FR" dirty="0"/>

</xml_diff>